<commit_message>
#81 Semana 17 Póster.
Finalización del poster para la entrega.
</commit_message>
<xml_diff>
--- a/Poster/posterDietaPorDientes.pptx
+++ b/Poster/posterDietaPorDientes.pptx
@@ -243,7 +243,7 @@
           <a:p>
             <a:fld id="{842213F8-830B-47DE-8BA2-7079542A1DF4}" type="datetimeFigureOut">
               <a:rPr lang="es-ES" smtClean="0"/>
-              <a:t>05/01/2017</a:t>
+              <a:t>12/01/2017</a:t>
             </a:fld>
             <a:endParaRPr lang="es-ES"/>
           </a:p>
@@ -413,7 +413,7 @@
           <a:p>
             <a:fld id="{842213F8-830B-47DE-8BA2-7079542A1DF4}" type="datetimeFigureOut">
               <a:rPr lang="es-ES" smtClean="0"/>
-              <a:t>05/01/2017</a:t>
+              <a:t>12/01/2017</a:t>
             </a:fld>
             <a:endParaRPr lang="es-ES"/>
           </a:p>
@@ -593,7 +593,7 @@
           <a:p>
             <a:fld id="{842213F8-830B-47DE-8BA2-7079542A1DF4}" type="datetimeFigureOut">
               <a:rPr lang="es-ES" smtClean="0"/>
-              <a:t>05/01/2017</a:t>
+              <a:t>12/01/2017</a:t>
             </a:fld>
             <a:endParaRPr lang="es-ES"/>
           </a:p>
@@ -763,7 +763,7 @@
           <a:p>
             <a:fld id="{842213F8-830B-47DE-8BA2-7079542A1DF4}" type="datetimeFigureOut">
               <a:rPr lang="es-ES" smtClean="0"/>
-              <a:t>05/01/2017</a:t>
+              <a:t>12/01/2017</a:t>
             </a:fld>
             <a:endParaRPr lang="es-ES"/>
           </a:p>
@@ -1007,7 +1007,7 @@
           <a:p>
             <a:fld id="{842213F8-830B-47DE-8BA2-7079542A1DF4}" type="datetimeFigureOut">
               <a:rPr lang="es-ES" smtClean="0"/>
-              <a:t>05/01/2017</a:t>
+              <a:t>12/01/2017</a:t>
             </a:fld>
             <a:endParaRPr lang="es-ES"/>
           </a:p>
@@ -1239,7 +1239,7 @@
           <a:p>
             <a:fld id="{842213F8-830B-47DE-8BA2-7079542A1DF4}" type="datetimeFigureOut">
               <a:rPr lang="es-ES" smtClean="0"/>
-              <a:t>05/01/2017</a:t>
+              <a:t>12/01/2017</a:t>
             </a:fld>
             <a:endParaRPr lang="es-ES"/>
           </a:p>
@@ -1606,7 +1606,7 @@
           <a:p>
             <a:fld id="{842213F8-830B-47DE-8BA2-7079542A1DF4}" type="datetimeFigureOut">
               <a:rPr lang="es-ES" smtClean="0"/>
-              <a:t>05/01/2017</a:t>
+              <a:t>12/01/2017</a:t>
             </a:fld>
             <a:endParaRPr lang="es-ES"/>
           </a:p>
@@ -1724,7 +1724,7 @@
           <a:p>
             <a:fld id="{842213F8-830B-47DE-8BA2-7079542A1DF4}" type="datetimeFigureOut">
               <a:rPr lang="es-ES" smtClean="0"/>
-              <a:t>05/01/2017</a:t>
+              <a:t>12/01/2017</a:t>
             </a:fld>
             <a:endParaRPr lang="es-ES"/>
           </a:p>
@@ -1819,7 +1819,7 @@
           <a:p>
             <a:fld id="{842213F8-830B-47DE-8BA2-7079542A1DF4}" type="datetimeFigureOut">
               <a:rPr lang="es-ES" smtClean="0"/>
-              <a:t>05/01/2017</a:t>
+              <a:t>12/01/2017</a:t>
             </a:fld>
             <a:endParaRPr lang="es-ES"/>
           </a:p>
@@ -2096,7 +2096,7 @@
           <a:p>
             <a:fld id="{842213F8-830B-47DE-8BA2-7079542A1DF4}" type="datetimeFigureOut">
               <a:rPr lang="es-ES" smtClean="0"/>
-              <a:t>05/01/2017</a:t>
+              <a:t>12/01/2017</a:t>
             </a:fld>
             <a:endParaRPr lang="es-ES"/>
           </a:p>
@@ -2353,7 +2353,7 @@
           <a:p>
             <a:fld id="{842213F8-830B-47DE-8BA2-7079542A1DF4}" type="datetimeFigureOut">
               <a:rPr lang="es-ES" smtClean="0"/>
-              <a:t>05/01/2017</a:t>
+              <a:t>12/01/2017</a:t>
             </a:fld>
             <a:endParaRPr lang="es-ES"/>
           </a:p>
@@ -2566,7 +2566,7 @@
           <a:p>
             <a:fld id="{842213F8-830B-47DE-8BA2-7079542A1DF4}" type="datetimeFigureOut">
               <a:rPr lang="es-ES" smtClean="0"/>
-              <a:t>05/01/2017</a:t>
+              <a:t>12/01/2017</a:t>
             </a:fld>
             <a:endParaRPr lang="es-ES"/>
           </a:p>
@@ -3001,65 +3001,14 @@
         </p:blipFill>
         <p:spPr>
           <a:xfrm>
-            <a:off x="9143385" y="26390612"/>
-            <a:ext cx="1969127" cy="1460644"/>
+            <a:off x="16219831" y="18157918"/>
+            <a:ext cx="3080671" cy="2285157"/>
           </a:xfrm>
           <a:prstGeom prst="rect">
             <a:avLst/>
           </a:prstGeom>
         </p:spPr>
       </p:pic>
-      <p:sp>
-        <p:nvSpPr>
-          <p:cNvPr id="86" name="Flecha a la derecha con bandas 85"/>
-          <p:cNvSpPr/>
-          <p:nvPr/>
-        </p:nvSpPr>
-        <p:spPr>
-          <a:xfrm rot="5400000">
-            <a:off x="6197194" y="18912421"/>
-            <a:ext cx="3420495" cy="2628408"/>
-          </a:xfrm>
-          <a:prstGeom prst="stripedRightArrow">
-            <a:avLst>
-              <a:gd name="adj1" fmla="val 60823"/>
-              <a:gd name="adj2" fmla="val 50000"/>
-            </a:avLst>
-          </a:prstGeom>
-          <a:solidFill>
-            <a:schemeClr val="bg1">
-              <a:lumMod val="75000"/>
-            </a:schemeClr>
-          </a:solidFill>
-          <a:ln>
-            <a:noFill/>
-          </a:ln>
-        </p:spPr>
-        <p:style>
-          <a:lnRef idx="2">
-            <a:schemeClr val="accent1">
-              <a:shade val="50000"/>
-            </a:schemeClr>
-          </a:lnRef>
-          <a:fillRef idx="1">
-            <a:schemeClr val="accent1"/>
-          </a:fillRef>
-          <a:effectRef idx="0">
-            <a:schemeClr val="accent1"/>
-          </a:effectRef>
-          <a:fontRef idx="minor">
-            <a:schemeClr val="lt1"/>
-          </a:fontRef>
-        </p:style>
-        <p:txBody>
-          <a:bodyPr rtlCol="0" anchor="ctr"/>
-          <a:lstStyle/>
-          <a:p>
-            <a:pPr algn="ctr"/>
-            <a:endParaRPr lang="es-ES"/>
-          </a:p>
-        </p:txBody>
-      </p:sp>
       <p:grpSp>
         <p:nvGrpSpPr>
           <p:cNvPr id="15" name="Grupo 14"/>
@@ -3069,9 +3018,9 @@
         <p:grpSpPr>
           <a:xfrm>
             <a:off x="324465" y="453529"/>
-            <a:ext cx="29732748" cy="5850720"/>
+            <a:ext cx="29675597" cy="5950279"/>
             <a:chOff x="6152399" y="729228"/>
-            <a:chExt cx="14360415" cy="4728852"/>
+            <a:chExt cx="14360415" cy="4587950"/>
           </a:xfrm>
         </p:grpSpPr>
         <p:sp>
@@ -3085,7 +3034,7 @@
           <p:spPr>
             <a:xfrm>
               <a:off x="6152399" y="729228"/>
-              <a:ext cx="14360415" cy="4728852"/>
+              <a:ext cx="14360415" cy="4587950"/>
             </a:xfrm>
             <a:prstGeom prst="rect">
               <a:avLst/>
@@ -3247,21 +3196,7 @@
                   <a:latin typeface="Arial" panose="020B0604020202020204" pitchFamily="34" charset="0"/>
                   <a:cs typeface="Arial" panose="020B0604020202020204" pitchFamily="34" charset="0"/>
                 </a:rPr>
-                <a:t>D. </a:t>
-              </a:r>
-              <a:r>
-                <a:rPr lang="es-ES" sz="3200" dirty="0" err="1" smtClean="0">
-                  <a:latin typeface="Arial" panose="020B0604020202020204" pitchFamily="34" charset="0"/>
-                  <a:cs typeface="Arial" panose="020B0604020202020204" pitchFamily="34" charset="0"/>
-                </a:rPr>
-                <a:t>Álvar</a:t>
-              </a:r>
-              <a:r>
-                <a:rPr lang="es-ES" sz="3200" dirty="0" smtClean="0">
-                  <a:latin typeface="Arial" panose="020B0604020202020204" pitchFamily="34" charset="0"/>
-                  <a:cs typeface="Arial" panose="020B0604020202020204" pitchFamily="34" charset="0"/>
-                </a:rPr>
-                <a:t>  Arnaiz González</a:t>
+                <a:t>D. Álvar  Arnaiz González</a:t>
               </a:r>
               <a:r>
                 <a:rPr lang="es-ES" sz="3200" dirty="0">
@@ -3281,7 +3216,21 @@
                   <a:latin typeface="Arial" panose="020B0604020202020204" pitchFamily="34" charset="0"/>
                   <a:cs typeface="Arial" panose="020B0604020202020204" pitchFamily="34" charset="0"/>
                 </a:rPr>
-                <a:t>Tutor: José Francisco Diez Pastor</a:t>
+                <a:t>Tutor: </a:t>
+              </a:r>
+              <a:r>
+                <a:rPr lang="es-ES" sz="3200" dirty="0" smtClean="0">
+                  <a:latin typeface="Arial" panose="020B0604020202020204" pitchFamily="34" charset="0"/>
+                  <a:cs typeface="Arial" panose="020B0604020202020204" pitchFamily="34" charset="0"/>
+                </a:rPr>
+                <a:t>Dr. José </a:t>
+              </a:r>
+              <a:r>
+                <a:rPr lang="es-ES" sz="3200" dirty="0">
+                  <a:latin typeface="Arial" panose="020B0604020202020204" pitchFamily="34" charset="0"/>
+                  <a:cs typeface="Arial" panose="020B0604020202020204" pitchFamily="34" charset="0"/>
+                </a:rPr>
+                <a:t>Francisco Diez Pastor</a:t>
               </a:r>
             </a:p>
           </p:txBody>
@@ -3358,7 +3307,7 @@
         </p:nvGrpSpPr>
         <p:grpSpPr>
           <a:xfrm>
-            <a:off x="20114973" y="1651819"/>
+            <a:off x="20114973" y="1537519"/>
             <a:ext cx="5284297" cy="4519628"/>
             <a:chOff x="20924656" y="519546"/>
             <a:chExt cx="5114321" cy="5055981"/>
@@ -3450,7 +3399,7 @@
         </p:nvGrpSpPr>
         <p:grpSpPr>
           <a:xfrm>
-            <a:off x="25160748" y="1019551"/>
+            <a:off x="25160748" y="905251"/>
             <a:ext cx="4572001" cy="5055982"/>
             <a:chOff x="25117863" y="-348585"/>
             <a:chExt cx="5114321" cy="6073246"/>
@@ -3566,7 +3515,7 @@
         </p:nvSpPr>
         <p:spPr>
           <a:xfrm>
-            <a:off x="267315" y="37021382"/>
+            <a:off x="267315" y="37859582"/>
             <a:ext cx="29732748" cy="1569660"/>
           </a:xfrm>
           <a:prstGeom prst="rect">
@@ -3787,14 +3736,14 @@
       </p:pic>
       <p:sp>
         <p:nvSpPr>
-          <p:cNvPr id="47" name="Rectángulo 46"/>
+          <p:cNvPr id="48" name="Rectángulo 47"/>
           <p:cNvSpPr/>
           <p:nvPr/>
         </p:nvSpPr>
         <p:spPr>
           <a:xfrm>
-            <a:off x="15133689" y="21878620"/>
-            <a:ext cx="14984360" cy="6844402"/>
+            <a:off x="390531" y="14021042"/>
+            <a:ext cx="29609531" cy="20497278"/>
           </a:xfrm>
           <a:prstGeom prst="rect">
             <a:avLst/>
@@ -3833,14 +3782,14 @@
       </p:sp>
       <p:sp>
         <p:nvSpPr>
-          <p:cNvPr id="48" name="Rectángulo 47"/>
+          <p:cNvPr id="53" name="Rectángulo 52"/>
           <p:cNvSpPr/>
           <p:nvPr/>
         </p:nvSpPr>
         <p:spPr>
           <a:xfrm>
-            <a:off x="390531" y="14998021"/>
-            <a:ext cx="29732748" cy="13688804"/>
+            <a:off x="390531" y="6960060"/>
+            <a:ext cx="29609531" cy="7058504"/>
           </a:xfrm>
           <a:prstGeom prst="rect">
             <a:avLst/>
@@ -3877,25 +3826,78 @@
           </a:p>
         </p:txBody>
       </p:sp>
-      <p:sp>
-        <p:nvSpPr>
-          <p:cNvPr id="53" name="Rectángulo 52"/>
-          <p:cNvSpPr/>
+      <p:pic>
+        <p:nvPicPr>
+          <p:cNvPr id="2" name="Imagen 1"/>
+          <p:cNvPicPr>
+            <a:picLocks noChangeAspect="1"/>
+          </p:cNvPicPr>
           <p:nvPr/>
-        </p:nvSpPr>
-        <p:spPr>
-          <a:xfrm>
-            <a:off x="390531" y="8141161"/>
-            <a:ext cx="29732748" cy="6844402"/>
+        </p:nvPicPr>
+        <p:blipFill>
+          <a:blip r:embed="rId12"/>
+          <a:stretch>
+            <a:fillRect/>
+          </a:stretch>
+        </p:blipFill>
+        <p:spPr>
+          <a:xfrm>
+            <a:off x="21478302" y="40182218"/>
+            <a:ext cx="4080706" cy="1902024"/>
           </a:xfrm>
           <a:prstGeom prst="rect">
             <a:avLst/>
           </a:prstGeom>
-          <a:noFill/>
-          <a:ln w="311150" cmpd="sng">
-            <a:solidFill>
-              <a:srgbClr val="00B0F0"/>
-            </a:solidFill>
+        </p:spPr>
+      </p:pic>
+      <p:pic>
+        <p:nvPicPr>
+          <p:cNvPr id="8" name="Imagen 7"/>
+          <p:cNvPicPr>
+            <a:picLocks noChangeAspect="1"/>
+          </p:cNvPicPr>
+          <p:nvPr/>
+        </p:nvPicPr>
+        <p:blipFill>
+          <a:blip r:embed="rId13"/>
+          <a:stretch>
+            <a:fillRect/>
+          </a:stretch>
+        </p:blipFill>
+        <p:spPr>
+          <a:xfrm>
+            <a:off x="26529765" y="40956195"/>
+            <a:ext cx="2765532" cy="590926"/>
+          </a:xfrm>
+          <a:prstGeom prst="rect">
+            <a:avLst/>
+          </a:prstGeom>
+        </p:spPr>
+      </p:pic>
+      <p:sp>
+        <p:nvSpPr>
+          <p:cNvPr id="68" name="Flecha a la derecha con bandas 67"/>
+          <p:cNvSpPr/>
+          <p:nvPr/>
+        </p:nvSpPr>
+        <p:spPr>
+          <a:xfrm>
+            <a:off x="22979542" y="11363753"/>
+            <a:ext cx="1219200" cy="1056088"/>
+          </a:xfrm>
+          <a:prstGeom prst="stripedRightArrow">
+            <a:avLst>
+              <a:gd name="adj1" fmla="val 60823"/>
+              <a:gd name="adj2" fmla="val 50000"/>
+            </a:avLst>
+          </a:prstGeom>
+          <a:solidFill>
+            <a:schemeClr val="bg1">
+              <a:lumMod val="75000"/>
+            </a:schemeClr>
+          </a:solidFill>
+          <a:ln>
+            <a:noFill/>
           </a:ln>
         </p:spPr>
         <p:style>
@@ -3923,73 +3925,30 @@
           </a:p>
         </p:txBody>
       </p:sp>
-      <p:pic>
-        <p:nvPicPr>
-          <p:cNvPr id="2" name="Imagen 1"/>
-          <p:cNvPicPr>
-            <a:picLocks noChangeAspect="1"/>
-          </p:cNvPicPr>
-          <p:nvPr/>
-        </p:nvPicPr>
-        <p:blipFill>
-          <a:blip r:embed="rId12"/>
-          <a:stretch>
-            <a:fillRect/>
-          </a:stretch>
-        </p:blipFill>
-        <p:spPr>
-          <a:xfrm>
-            <a:off x="22212401" y="40489990"/>
-            <a:ext cx="3161250" cy="1473464"/>
-          </a:xfrm>
-          <a:prstGeom prst="rect">
-            <a:avLst/>
-          </a:prstGeom>
-        </p:spPr>
-      </p:pic>
-      <p:pic>
-        <p:nvPicPr>
-          <p:cNvPr id="8" name="Imagen 7"/>
-          <p:cNvPicPr>
-            <a:picLocks noChangeAspect="1"/>
-          </p:cNvPicPr>
-          <p:nvPr/>
-        </p:nvPicPr>
-        <p:blipFill>
-          <a:blip r:embed="rId13"/>
-          <a:stretch>
-            <a:fillRect/>
-          </a:stretch>
-        </p:blipFill>
-        <p:spPr>
-          <a:xfrm>
-            <a:off x="26529765" y="40956195"/>
-            <a:ext cx="2765532" cy="590926"/>
-          </a:xfrm>
-          <a:prstGeom prst="rect">
-            <a:avLst/>
-          </a:prstGeom>
-        </p:spPr>
-      </p:pic>
-      <p:sp>
-        <p:nvSpPr>
-          <p:cNvPr id="65" name="Rectángulo 64"/>
+      <p:sp>
+        <p:nvSpPr>
+          <p:cNvPr id="66" name="Flecha a la derecha con bandas 65"/>
           <p:cNvSpPr/>
           <p:nvPr/>
         </p:nvSpPr>
         <p:spPr>
           <a:xfrm>
-            <a:off x="396000" y="28728000"/>
-            <a:ext cx="29732748" cy="6844402"/>
-          </a:xfrm>
-          <a:prstGeom prst="rect">
-            <a:avLst/>
+            <a:off x="12358946" y="11315936"/>
+            <a:ext cx="1406853" cy="1354047"/>
+          </a:xfrm>
+          <a:prstGeom prst="stripedRightArrow">
+            <a:avLst>
+              <a:gd name="adj1" fmla="val 60823"/>
+              <a:gd name="adj2" fmla="val 50000"/>
+            </a:avLst>
           </a:prstGeom>
-          <a:noFill/>
-          <a:ln w="311150" cmpd="sng">
-            <a:solidFill>
-              <a:srgbClr val="00B0F0"/>
-            </a:solidFill>
+          <a:solidFill>
+            <a:schemeClr val="bg1">
+              <a:lumMod val="75000"/>
+            </a:schemeClr>
+          </a:solidFill>
+          <a:ln>
+            <a:noFill/>
           </a:ln>
         </p:spPr>
         <p:style>
@@ -4019,60 +3978,28 @@
       </p:sp>
       <p:sp>
         <p:nvSpPr>
-          <p:cNvPr id="18" name="CuadroTexto 17"/>
-          <p:cNvSpPr txBox="1"/>
-          <p:nvPr/>
-        </p:nvSpPr>
-        <p:spPr>
-          <a:xfrm>
-            <a:off x="873485" y="11038680"/>
-            <a:ext cx="3809099" cy="523220"/>
-          </a:xfrm>
-          <a:prstGeom prst="rect">
-            <a:avLst/>
-          </a:prstGeom>
-          <a:noFill/>
-        </p:spPr>
-        <p:txBody>
-          <a:bodyPr wrap="square" rtlCol="0">
-            <a:spAutoFit/>
-          </a:bodyPr>
-          <a:lstStyle/>
-          <a:p>
-            <a:r>
-              <a:rPr lang="es-ES" sz="2800" dirty="0" smtClean="0"/>
-              <a:t>Diente 100x aumentos.</a:t>
-            </a:r>
-            <a:endParaRPr lang="es-ES" sz="2800" dirty="0"/>
-          </a:p>
-        </p:txBody>
-      </p:sp>
-      <p:sp>
-        <p:nvSpPr>
-          <p:cNvPr id="25" name="Llamada rectangular 24"/>
+          <p:cNvPr id="35" name="Flecha a la derecha con bandas 34"/>
           <p:cNvSpPr/>
           <p:nvPr/>
         </p:nvSpPr>
         <p:spPr>
           <a:xfrm>
-            <a:off x="5814066" y="13239751"/>
-            <a:ext cx="3425183" cy="1256684"/>
-          </a:xfrm>
-          <a:prstGeom prst="wedgeRectCallout">
+            <a:off x="5581912" y="11269454"/>
+            <a:ext cx="1406853" cy="1354047"/>
+          </a:xfrm>
+          <a:prstGeom prst="stripedRightArrow">
             <a:avLst>
-              <a:gd name="adj1" fmla="val -103588"/>
-              <a:gd name="adj2" fmla="val -131998"/>
+              <a:gd name="adj1" fmla="val 60823"/>
+              <a:gd name="adj2" fmla="val 50000"/>
             </a:avLst>
           </a:prstGeom>
           <a:solidFill>
             <a:schemeClr val="bg1">
-              <a:alpha val="2000"/>
+              <a:lumMod val="75000"/>
             </a:schemeClr>
           </a:solidFill>
-          <a:ln w="19050">
-            <a:solidFill>
-              <a:schemeClr val="tx1"/>
-            </a:solidFill>
+          <a:ln>
+            <a:noFill/>
           </a:ln>
         </p:spPr>
         <p:style>
@@ -4100,22 +4027,286 @@
           </a:p>
         </p:txBody>
       </p:sp>
-      <p:sp>
-        <p:nvSpPr>
-          <p:cNvPr id="35" name="Flecha a la derecha con bandas 34"/>
+      <p:grpSp>
+        <p:nvGrpSpPr>
+          <p:cNvPr id="1036" name="Grupo 1035"/>
+          <p:cNvGrpSpPr/>
+          <p:nvPr/>
+        </p:nvGrpSpPr>
+        <p:grpSpPr>
+          <a:xfrm>
+            <a:off x="7779671" y="8839518"/>
+            <a:ext cx="21472489" cy="4419466"/>
+            <a:chOff x="11492708" y="11311246"/>
+            <a:chExt cx="18608389" cy="3446961"/>
+          </a:xfrm>
+        </p:grpSpPr>
+        <p:pic>
+          <p:nvPicPr>
+            <p:cNvPr id="40" name="Imagen 39"/>
+            <p:cNvPicPr>
+              <a:picLocks noChangeAspect="1"/>
+            </p:cNvPicPr>
+            <p:nvPr/>
+          </p:nvPicPr>
+          <p:blipFill>
+            <a:blip r:embed="rId14"/>
+            <a:stretch>
+              <a:fillRect/>
+            </a:stretch>
+          </p:blipFill>
+          <p:spPr>
+            <a:xfrm>
+              <a:off x="16868105" y="12382174"/>
+              <a:ext cx="3810831" cy="2376033"/>
+            </a:xfrm>
+            <a:prstGeom prst="rect">
+              <a:avLst/>
+            </a:prstGeom>
+          </p:spPr>
+        </p:pic>
+        <p:sp>
+          <p:nvSpPr>
+            <p:cNvPr id="72" name="CuadroTexto 71"/>
+            <p:cNvSpPr txBox="1"/>
+            <p:nvPr/>
+          </p:nvSpPr>
+          <p:spPr>
+            <a:xfrm>
+              <a:off x="11492708" y="11311246"/>
+              <a:ext cx="3968470" cy="552115"/>
+            </a:xfrm>
+            <a:prstGeom prst="rect">
+              <a:avLst/>
+            </a:prstGeom>
+            <a:noFill/>
+          </p:spPr>
+          <p:txBody>
+            <a:bodyPr wrap="square" rtlCol="0">
+              <a:spAutoFit/>
+            </a:bodyPr>
+            <a:lstStyle/>
+            <a:p>
+              <a:r>
+                <a:rPr lang="es-ES" sz="4000" dirty="0" smtClean="0"/>
+                <a:t>Estrías identificadas</a:t>
+              </a:r>
+              <a:endParaRPr lang="es-ES" sz="4000" dirty="0"/>
+            </a:p>
+          </p:txBody>
+        </p:sp>
+        <p:sp>
+          <p:nvSpPr>
+            <p:cNvPr id="73" name="CuadroTexto 72"/>
+            <p:cNvSpPr txBox="1"/>
+            <p:nvPr/>
+          </p:nvSpPr>
+          <p:spPr>
+            <a:xfrm>
+              <a:off x="16831142" y="11763518"/>
+              <a:ext cx="7489225" cy="552115"/>
+            </a:xfrm>
+            <a:prstGeom prst="rect">
+              <a:avLst/>
+            </a:prstGeom>
+            <a:noFill/>
+          </p:spPr>
+          <p:txBody>
+            <a:bodyPr wrap="square" rtlCol="0">
+              <a:spAutoFit/>
+            </a:bodyPr>
+            <a:lstStyle/>
+            <a:p>
+              <a:pPr algn="ctr"/>
+              <a:r>
+                <a:rPr lang="es-ES" sz="4000" dirty="0" smtClean="0"/>
+                <a:t>Resultados y estadísticas</a:t>
+              </a:r>
+              <a:endParaRPr lang="es-ES" sz="4000" dirty="0"/>
+            </a:p>
+          </p:txBody>
+        </p:sp>
+        <p:sp>
+          <p:nvSpPr>
+            <p:cNvPr id="74" name="CuadroTexto 73"/>
+            <p:cNvSpPr txBox="1"/>
+            <p:nvPr/>
+          </p:nvSpPr>
+          <p:spPr>
+            <a:xfrm>
+              <a:off x="26238151" y="11393765"/>
+              <a:ext cx="3862946" cy="552115"/>
+            </a:xfrm>
+            <a:prstGeom prst="rect">
+              <a:avLst/>
+            </a:prstGeom>
+            <a:noFill/>
+          </p:spPr>
+          <p:txBody>
+            <a:bodyPr wrap="square" rtlCol="0">
+              <a:spAutoFit/>
+            </a:bodyPr>
+            <a:lstStyle/>
+            <a:p>
+              <a:pPr algn="ctr"/>
+              <a:r>
+                <a:rPr lang="es-ES" sz="4000" dirty="0" smtClean="0"/>
+                <a:t>Dieta estimada</a:t>
+              </a:r>
+              <a:endParaRPr lang="es-ES" sz="4000" dirty="0"/>
+            </a:p>
+          </p:txBody>
+        </p:sp>
+      </p:grpSp>
+      <p:sp>
+        <p:nvSpPr>
+          <p:cNvPr id="75" name="CuadroTexto 74"/>
+          <p:cNvSpPr txBox="1"/>
+          <p:nvPr/>
+        </p:nvSpPr>
+        <p:spPr>
+          <a:xfrm>
+            <a:off x="628237" y="7296150"/>
+            <a:ext cx="29371826" cy="1754326"/>
+          </a:xfrm>
+          <a:prstGeom prst="rect">
+            <a:avLst/>
+          </a:prstGeom>
+          <a:noFill/>
+        </p:spPr>
+        <p:txBody>
+          <a:bodyPr wrap="square" rtlCol="0">
+            <a:spAutoFit/>
+          </a:bodyPr>
+          <a:lstStyle/>
+          <a:p>
+            <a:r>
+              <a:rPr lang="es-ES" sz="5400" dirty="0" smtClean="0"/>
+              <a:t>El proyecto estima la dieta a partir del análisis de las estrías provocadas por la ingesta de alimentos en las piezas dentales.</a:t>
+            </a:r>
+          </a:p>
+        </p:txBody>
+      </p:sp>
+      <p:sp>
+        <p:nvSpPr>
+          <p:cNvPr id="69" name="CuadroTexto 68"/>
+          <p:cNvSpPr txBox="1"/>
+          <p:nvPr/>
+        </p:nvSpPr>
+        <p:spPr>
+          <a:xfrm>
+            <a:off x="619324" y="14343606"/>
+            <a:ext cx="29380738" cy="1200329"/>
+          </a:xfrm>
+          <a:prstGeom prst="rect">
+            <a:avLst/>
+          </a:prstGeom>
+          <a:noFill/>
+        </p:spPr>
+        <p:txBody>
+          <a:bodyPr wrap="square" rtlCol="0">
+            <a:spAutoFit/>
+          </a:bodyPr>
+          <a:lstStyle/>
+          <a:p>
+            <a:pPr algn="ctr"/>
+            <a:r>
+              <a:rPr lang="es-ES" sz="7200" dirty="0" smtClean="0"/>
+              <a:t>Modo semiautomático</a:t>
+            </a:r>
+            <a:endParaRPr lang="es-ES" sz="7200" dirty="0"/>
+          </a:p>
+        </p:txBody>
+      </p:sp>
+      <p:grpSp>
+        <p:nvGrpSpPr>
+          <p:cNvPr id="1041" name="Grupo 1040"/>
+          <p:cNvGrpSpPr/>
+          <p:nvPr/>
+        </p:nvGrpSpPr>
+        <p:grpSpPr>
+          <a:xfrm>
+            <a:off x="4721664" y="21791908"/>
+            <a:ext cx="12235720" cy="5384617"/>
+            <a:chOff x="1089582" y="24887545"/>
+            <a:chExt cx="10130450" cy="4451725"/>
+          </a:xfrm>
+        </p:grpSpPr>
+        <p:sp>
+          <p:nvSpPr>
+            <p:cNvPr id="71" name="CuadroTexto 70"/>
+            <p:cNvSpPr txBox="1"/>
+            <p:nvPr/>
+          </p:nvSpPr>
+          <p:spPr>
+            <a:xfrm>
+              <a:off x="1089582" y="24887545"/>
+              <a:ext cx="4173993" cy="585244"/>
+            </a:xfrm>
+            <a:prstGeom prst="rect">
+              <a:avLst/>
+            </a:prstGeom>
+            <a:noFill/>
+          </p:spPr>
+          <p:txBody>
+            <a:bodyPr wrap="square" rtlCol="0">
+              <a:spAutoFit/>
+            </a:bodyPr>
+            <a:lstStyle/>
+            <a:p>
+              <a:pPr algn="ctr"/>
+              <a:r>
+                <a:rPr lang="es-ES" sz="4000" dirty="0" smtClean="0"/>
+                <a:t>Binarización</a:t>
+              </a:r>
+              <a:endParaRPr lang="es-ES" sz="2800" dirty="0"/>
+            </a:p>
+          </p:txBody>
+        </p:sp>
+        <p:pic>
+          <p:nvPicPr>
+            <p:cNvPr id="88" name="Imagen 87"/>
+            <p:cNvPicPr>
+              <a:picLocks noChangeAspect="1"/>
+            </p:cNvPicPr>
+            <p:nvPr/>
+          </p:nvPicPr>
+          <p:blipFill>
+            <a:blip r:embed="rId15">
+              <a:extLst>
+                <a:ext uri="{28A0092B-C50C-407E-A947-70E740481C1C}">
+                  <a14:useLocalDpi xmlns:a14="http://schemas.microsoft.com/office/drawing/2010/main" val="0"/>
+                </a:ext>
+              </a:extLst>
+            </a:blip>
+            <a:stretch>
+              <a:fillRect/>
+            </a:stretch>
+          </p:blipFill>
+          <p:spPr>
+            <a:xfrm>
+              <a:off x="6948568" y="25314498"/>
+              <a:ext cx="4271464" cy="4024772"/>
+            </a:xfrm>
+            <a:prstGeom prst="rect">
+              <a:avLst/>
+            </a:prstGeom>
+          </p:spPr>
+        </p:pic>
+      </p:grpSp>
+      <p:sp>
+        <p:nvSpPr>
+          <p:cNvPr id="100" name="Flecha derecha 99"/>
           <p:cNvSpPr/>
           <p:nvPr/>
         </p:nvSpPr>
         <p:spPr>
           <a:xfrm>
-            <a:off x="9688552" y="12566813"/>
-            <a:ext cx="1219200" cy="1056088"/>
-          </a:xfrm>
-          <a:prstGeom prst="stripedRightArrow">
-            <a:avLst>
-              <a:gd name="adj1" fmla="val 60823"/>
-              <a:gd name="adj2" fmla="val 50000"/>
-            </a:avLst>
+            <a:off x="17548567" y="24083527"/>
+            <a:ext cx="1451585" cy="1136579"/>
+          </a:xfrm>
+          <a:prstGeom prst="rightArrow">
+            <a:avLst/>
           </a:prstGeom>
           <a:solidFill>
             <a:schemeClr val="bg1">
@@ -4151,22 +4342,330 @@
           </a:p>
         </p:txBody>
       </p:sp>
-      <p:sp>
-        <p:nvSpPr>
-          <p:cNvPr id="66" name="Flecha a la derecha con bandas 65"/>
+      <p:grpSp>
+        <p:nvGrpSpPr>
+          <p:cNvPr id="1033" name="Grupo 1032"/>
+          <p:cNvGrpSpPr/>
+          <p:nvPr/>
+        </p:nvGrpSpPr>
+        <p:grpSpPr>
+          <a:xfrm>
+            <a:off x="9866038" y="15821425"/>
+            <a:ext cx="11036603" cy="2080220"/>
+            <a:chOff x="4973259" y="23247069"/>
+            <a:chExt cx="8657436" cy="2080220"/>
+          </a:xfrm>
+        </p:grpSpPr>
+        <p:sp>
+          <p:nvSpPr>
+            <p:cNvPr id="80" name="Flecha a la derecha con bandas 79"/>
+            <p:cNvSpPr/>
+            <p:nvPr/>
+          </p:nvSpPr>
+          <p:spPr>
+            <a:xfrm>
+              <a:off x="4973259" y="23247069"/>
+              <a:ext cx="8657436" cy="2080220"/>
+            </a:xfrm>
+            <a:prstGeom prst="stripedRightArrow">
+              <a:avLst>
+                <a:gd name="adj1" fmla="val 60823"/>
+                <a:gd name="adj2" fmla="val 50000"/>
+              </a:avLst>
+            </a:prstGeom>
+            <a:solidFill>
+              <a:schemeClr val="bg1">
+                <a:lumMod val="75000"/>
+              </a:schemeClr>
+            </a:solidFill>
+            <a:ln>
+              <a:noFill/>
+            </a:ln>
+          </p:spPr>
+          <p:style>
+            <a:lnRef idx="2">
+              <a:schemeClr val="accent1">
+                <a:shade val="50000"/>
+              </a:schemeClr>
+            </a:lnRef>
+            <a:fillRef idx="1">
+              <a:schemeClr val="accent1"/>
+            </a:fillRef>
+            <a:effectRef idx="0">
+              <a:schemeClr val="accent1"/>
+            </a:effectRef>
+            <a:fontRef idx="minor">
+              <a:schemeClr val="lt1"/>
+            </a:fontRef>
+          </p:style>
+          <p:txBody>
+            <a:bodyPr rtlCol="0" anchor="ctr"/>
+            <a:lstStyle/>
+            <a:p>
+              <a:pPr algn="ctr"/>
+              <a:endParaRPr lang="es-ES"/>
+            </a:p>
+          </p:txBody>
+        </p:sp>
+        <p:sp>
+          <p:nvSpPr>
+            <p:cNvPr id="82" name="CuadroTexto 81"/>
+            <p:cNvSpPr txBox="1"/>
+            <p:nvPr/>
+          </p:nvSpPr>
+          <p:spPr>
+            <a:xfrm>
+              <a:off x="5082642" y="23829027"/>
+              <a:ext cx="7673464" cy="1015663"/>
+            </a:xfrm>
+            <a:prstGeom prst="rect">
+              <a:avLst/>
+            </a:prstGeom>
+            <a:noFill/>
+          </p:spPr>
+          <p:txBody>
+            <a:bodyPr wrap="square" rtlCol="0">
+              <a:spAutoFit/>
+            </a:bodyPr>
+            <a:lstStyle/>
+            <a:p>
+              <a:pPr algn="ctr"/>
+              <a:r>
+                <a:rPr lang="es-ES" sz="6000" dirty="0" smtClean="0"/>
+                <a:t>Ejecución del algoritmo</a:t>
+              </a:r>
+              <a:endParaRPr lang="es-ES" sz="6000" dirty="0"/>
+            </a:p>
+          </p:txBody>
+        </p:sp>
+      </p:grpSp>
+      <p:grpSp>
+        <p:nvGrpSpPr>
+          <p:cNvPr id="1040" name="Grupo 1039"/>
+          <p:cNvGrpSpPr/>
+          <p:nvPr/>
+        </p:nvGrpSpPr>
+        <p:grpSpPr>
+          <a:xfrm>
+            <a:off x="4398233" y="21711120"/>
+            <a:ext cx="12544466" cy="5472386"/>
+            <a:chOff x="961371" y="24613582"/>
+            <a:chExt cx="10331111" cy="4465064"/>
+          </a:xfrm>
+        </p:grpSpPr>
+        <p:pic>
+          <p:nvPicPr>
+            <p:cNvPr id="87" name="Imagen 86"/>
+            <p:cNvPicPr>
+              <a:picLocks noChangeAspect="1"/>
+            </p:cNvPicPr>
+            <p:nvPr/>
+          </p:nvPicPr>
+          <p:blipFill>
+            <a:blip r:embed="rId16">
+              <a:extLst>
+                <a:ext uri="{28A0092B-C50C-407E-A947-70E740481C1C}">
+                  <a14:useLocalDpi xmlns:a14="http://schemas.microsoft.com/office/drawing/2010/main" val="0"/>
+                </a:ext>
+              </a:extLst>
+            </a:blip>
+            <a:stretch>
+              <a:fillRect/>
+            </a:stretch>
+          </p:blipFill>
+          <p:spPr>
+            <a:xfrm>
+              <a:off x="961371" y="25113897"/>
+              <a:ext cx="4074879" cy="3964749"/>
+            </a:xfrm>
+            <a:prstGeom prst="rect">
+              <a:avLst/>
+            </a:prstGeom>
+          </p:spPr>
+        </p:pic>
+        <p:sp>
+          <p:nvSpPr>
+            <p:cNvPr id="105" name="CuadroTexto 104"/>
+            <p:cNvSpPr txBox="1"/>
+            <p:nvPr/>
+          </p:nvSpPr>
+          <p:spPr>
+            <a:xfrm>
+              <a:off x="7067808" y="24613582"/>
+              <a:ext cx="4224674" cy="577583"/>
+            </a:xfrm>
+            <a:prstGeom prst="rect">
+              <a:avLst/>
+            </a:prstGeom>
+            <a:noFill/>
+          </p:spPr>
+          <p:txBody>
+            <a:bodyPr wrap="square" rtlCol="0">
+              <a:spAutoFit/>
+            </a:bodyPr>
+            <a:lstStyle/>
+            <a:p>
+              <a:pPr algn="ctr"/>
+              <a:r>
+                <a:rPr lang="es-ES" sz="4000" dirty="0" smtClean="0"/>
+                <a:t>Reducción de grosor</a:t>
+              </a:r>
+              <a:endParaRPr lang="es-ES" sz="4000" dirty="0"/>
+            </a:p>
+          </p:txBody>
+        </p:sp>
+      </p:grpSp>
+      <p:sp>
+        <p:nvSpPr>
+          <p:cNvPr id="98" name="CuadroTexto 97"/>
+          <p:cNvSpPr txBox="1"/>
+          <p:nvPr/>
+        </p:nvSpPr>
+        <p:spPr>
+          <a:xfrm>
+            <a:off x="18032549" y="18408316"/>
+            <a:ext cx="1215070" cy="619598"/>
+          </a:xfrm>
+          <a:prstGeom prst="rect">
+            <a:avLst/>
+          </a:prstGeom>
+          <a:noFill/>
+        </p:spPr>
+        <p:txBody>
+          <a:bodyPr wrap="square" rtlCol="0">
+            <a:spAutoFit/>
+          </a:bodyPr>
+          <a:lstStyle/>
+          <a:p>
+            <a:endParaRPr lang="es-ES" dirty="0"/>
+          </a:p>
+        </p:txBody>
+      </p:sp>
+      <p:sp>
+        <p:nvSpPr>
+          <p:cNvPr id="108" name="CuadroTexto 107"/>
+          <p:cNvSpPr txBox="1"/>
+          <p:nvPr/>
+        </p:nvSpPr>
+        <p:spPr>
+          <a:xfrm>
+            <a:off x="13540729" y="18269247"/>
+            <a:ext cx="6285154" cy="1446550"/>
+          </a:xfrm>
+          <a:prstGeom prst="rect">
+            <a:avLst/>
+          </a:prstGeom>
+          <a:noFill/>
+        </p:spPr>
+        <p:txBody>
+          <a:bodyPr wrap="square" rtlCol="0">
+            <a:spAutoFit/>
+          </a:bodyPr>
+          <a:lstStyle/>
+          <a:p>
+            <a:r>
+              <a:rPr lang="es-ES" sz="4400" dirty="0" smtClean="0"/>
+              <a:t>Unión de</a:t>
+            </a:r>
+          </a:p>
+          <a:p>
+            <a:r>
+              <a:rPr lang="es-ES" sz="4400" dirty="0" smtClean="0"/>
+              <a:t> segmentos</a:t>
+            </a:r>
+            <a:endParaRPr lang="es-ES" sz="4400" dirty="0"/>
+          </a:p>
+        </p:txBody>
+      </p:sp>
+      <p:grpSp>
+        <p:nvGrpSpPr>
+          <p:cNvPr id="1039" name="Grupo 1038"/>
+          <p:cNvGrpSpPr/>
+          <p:nvPr/>
+        </p:nvGrpSpPr>
+        <p:grpSpPr>
+          <a:xfrm>
+            <a:off x="19631940" y="21647557"/>
+            <a:ext cx="5474268" cy="5479547"/>
+            <a:chOff x="14031389" y="24320637"/>
+            <a:chExt cx="4235063" cy="4721233"/>
+          </a:xfrm>
+        </p:grpSpPr>
+        <p:pic>
+          <p:nvPicPr>
+            <p:cNvPr id="89" name="Imagen 88"/>
+            <p:cNvPicPr>
+              <a:picLocks noChangeAspect="1"/>
+            </p:cNvPicPr>
+            <p:nvPr/>
+          </p:nvPicPr>
+          <p:blipFill>
+            <a:blip r:embed="rId17">
+              <a:extLst>
+                <a:ext uri="{28A0092B-C50C-407E-A947-70E740481C1C}">
+                  <a14:useLocalDpi xmlns:a14="http://schemas.microsoft.com/office/drawing/2010/main" val="0"/>
+                </a:ext>
+              </a:extLst>
+            </a:blip>
+            <a:stretch>
+              <a:fillRect/>
+            </a:stretch>
+          </p:blipFill>
+          <p:spPr>
+            <a:xfrm>
+              <a:off x="14032145" y="24847383"/>
+              <a:ext cx="4234307" cy="4194487"/>
+            </a:xfrm>
+            <a:prstGeom prst="rect">
+              <a:avLst/>
+            </a:prstGeom>
+          </p:spPr>
+        </p:pic>
+        <p:sp>
+          <p:nvSpPr>
+            <p:cNvPr id="154" name="CuadroTexto 153"/>
+            <p:cNvSpPr txBox="1"/>
+            <p:nvPr/>
+          </p:nvSpPr>
+          <p:spPr>
+            <a:xfrm>
+              <a:off x="14031389" y="24320637"/>
+              <a:ext cx="4235063" cy="609922"/>
+            </a:xfrm>
+            <a:prstGeom prst="rect">
+              <a:avLst/>
+            </a:prstGeom>
+            <a:noFill/>
+          </p:spPr>
+          <p:txBody>
+            <a:bodyPr wrap="square" rtlCol="0">
+              <a:spAutoFit/>
+            </a:bodyPr>
+            <a:lstStyle/>
+            <a:p>
+              <a:pPr algn="ctr"/>
+              <a:r>
+                <a:rPr lang="es-ES" sz="4000" dirty="0" smtClean="0"/>
+                <a:t>Hough</a:t>
+              </a:r>
+              <a:endParaRPr lang="es-ES" sz="4000" dirty="0"/>
+            </a:p>
+          </p:txBody>
+        </p:sp>
+      </p:grpSp>
+      <p:sp>
+        <p:nvSpPr>
+          <p:cNvPr id="161" name="Flecha derecha 160"/>
           <p:cNvSpPr/>
           <p:nvPr/>
         </p:nvSpPr>
         <p:spPr>
           <a:xfrm>
-            <a:off x="15971785" y="12566813"/>
-            <a:ext cx="1219200" cy="1056088"/>
-          </a:xfrm>
-          <a:prstGeom prst="stripedRightArrow">
-            <a:avLst>
-              <a:gd name="adj1" fmla="val 60823"/>
-              <a:gd name="adj2" fmla="val 50000"/>
-            </a:avLst>
+            <a:off x="14438285" y="20054890"/>
+            <a:ext cx="720591" cy="609752"/>
+          </a:xfrm>
+          <a:prstGeom prst="rightArrow">
+            <a:avLst/>
           </a:prstGeom>
           <a:solidFill>
             <a:schemeClr val="bg1">
@@ -4204,20 +4703,17 @@
       </p:sp>
       <p:sp>
         <p:nvSpPr>
-          <p:cNvPr id="68" name="Flecha a la derecha con bandas 67"/>
+          <p:cNvPr id="162" name="Flecha derecha 161"/>
           <p:cNvSpPr/>
           <p:nvPr/>
         </p:nvSpPr>
         <p:spPr>
           <a:xfrm>
-            <a:off x="20147701" y="12571029"/>
-            <a:ext cx="1219200" cy="1056088"/>
-          </a:xfrm>
-          <a:prstGeom prst="stripedRightArrow">
-            <a:avLst>
-              <a:gd name="adj1" fmla="val 60823"/>
-              <a:gd name="adj2" fmla="val 50000"/>
-            </a:avLst>
+            <a:off x="9817613" y="24083527"/>
+            <a:ext cx="1451585" cy="1136579"/>
+          </a:xfrm>
+          <a:prstGeom prst="rightArrow">
+            <a:avLst/>
           </a:prstGeom>
           <a:solidFill>
             <a:schemeClr val="bg1">
@@ -4253,486 +4749,29 @@
           </a:p>
         </p:txBody>
       </p:sp>
-      <p:grpSp>
-        <p:nvGrpSpPr>
-          <p:cNvPr id="67" name="Grupo 66"/>
-          <p:cNvGrpSpPr/>
+      <p:sp>
+        <p:nvSpPr>
+          <p:cNvPr id="90" name="Llamada rectangular redondeada 89"/>
+          <p:cNvSpPr/>
           <p:nvPr/>
-        </p:nvGrpSpPr>
-        <p:grpSpPr>
-          <a:xfrm>
-            <a:off x="628237" y="11372850"/>
-            <a:ext cx="24779276" cy="3399306"/>
-            <a:chOff x="628237" y="11372850"/>
-            <a:chExt cx="24779276" cy="3399306"/>
-          </a:xfrm>
-        </p:grpSpPr>
-        <p:pic>
-          <p:nvPicPr>
-            <p:cNvPr id="17" name="Imagen 16" descr="sss&#10;" title="Imagen de un diente a 100x aumentos al microscopio"/>
-            <p:cNvPicPr>
-              <a:picLocks noChangeAspect="1"/>
-            </p:cNvPicPr>
-            <p:nvPr/>
-          </p:nvPicPr>
-          <p:blipFill>
-            <a:blip r:embed="rId14"/>
-            <a:stretch>
-              <a:fillRect/>
-            </a:stretch>
-          </p:blipFill>
-          <p:spPr>
-            <a:xfrm>
-              <a:off x="628237" y="11561900"/>
-              <a:ext cx="4299597" cy="3210256"/>
-            </a:xfrm>
-            <a:prstGeom prst="rect">
-              <a:avLst/>
-            </a:prstGeom>
-            <a:ln>
-              <a:noFill/>
-            </a:ln>
-          </p:spPr>
-        </p:pic>
-        <p:pic>
-          <p:nvPicPr>
-            <p:cNvPr id="33" name="Imagen 32"/>
-            <p:cNvPicPr>
-              <a:picLocks noChangeAspect="1"/>
-            </p:cNvPicPr>
-            <p:nvPr/>
-          </p:nvPicPr>
-          <p:blipFill>
-            <a:blip r:embed="rId15"/>
-            <a:stretch>
-              <a:fillRect/>
-            </a:stretch>
-          </p:blipFill>
-          <p:spPr>
-            <a:xfrm>
-              <a:off x="5900120" y="13344103"/>
-              <a:ext cx="3249980" cy="1065271"/>
-            </a:xfrm>
-            <a:prstGeom prst="rect">
-              <a:avLst/>
-            </a:prstGeom>
-          </p:spPr>
-        </p:pic>
-        <p:pic>
-          <p:nvPicPr>
-            <p:cNvPr id="36" name="Imagen 35"/>
-            <p:cNvPicPr>
-              <a:picLocks noChangeAspect="1"/>
-            </p:cNvPicPr>
-            <p:nvPr/>
-          </p:nvPicPr>
-          <p:blipFill>
-            <a:blip r:embed="rId16"/>
-            <a:stretch>
-              <a:fillRect/>
-            </a:stretch>
-          </p:blipFill>
-          <p:spPr>
-            <a:xfrm>
-              <a:off x="11303819" y="11557734"/>
-              <a:ext cx="4299597" cy="3214422"/>
-            </a:xfrm>
-            <a:prstGeom prst="rect">
-              <a:avLst/>
-            </a:prstGeom>
-          </p:spPr>
-        </p:pic>
-        <p:grpSp>
-          <p:nvGrpSpPr>
-            <p:cNvPr id="46" name="Grupo 45"/>
-            <p:cNvGrpSpPr/>
-            <p:nvPr/>
-          </p:nvGrpSpPr>
-          <p:grpSpPr>
-            <a:xfrm>
-              <a:off x="17683786" y="11560451"/>
-              <a:ext cx="1970491" cy="3210005"/>
-              <a:chOff x="19555128" y="11545342"/>
-              <a:chExt cx="1970491" cy="3210005"/>
-            </a:xfrm>
-          </p:grpSpPr>
-          <p:pic>
-            <p:nvPicPr>
-              <p:cNvPr id="38" name="Imagen 37"/>
-              <p:cNvPicPr>
-                <a:picLocks noChangeAspect="1"/>
-              </p:cNvPicPr>
-              <p:nvPr/>
-            </p:nvPicPr>
-            <p:blipFill>
-              <a:blip r:embed="rId17"/>
-              <a:stretch>
-                <a:fillRect/>
-              </a:stretch>
-            </p:blipFill>
-            <p:spPr>
-              <a:xfrm>
-                <a:off x="19555128" y="11545342"/>
-                <a:ext cx="1970491" cy="1204189"/>
-              </a:xfrm>
-              <a:prstGeom prst="rect">
-                <a:avLst/>
-              </a:prstGeom>
-            </p:spPr>
-          </p:pic>
-          <p:pic>
-            <p:nvPicPr>
-              <p:cNvPr id="40" name="Imagen 39"/>
-              <p:cNvPicPr>
-                <a:picLocks noChangeAspect="1"/>
-              </p:cNvPicPr>
-              <p:nvPr/>
-            </p:nvPicPr>
-            <p:blipFill>
-              <a:blip r:embed="rId18"/>
-              <a:stretch>
-                <a:fillRect/>
-              </a:stretch>
-            </p:blipFill>
-            <p:spPr>
-              <a:xfrm>
-                <a:off x="19555128" y="13533932"/>
-                <a:ext cx="1958985" cy="1221415"/>
-              </a:xfrm>
-              <a:prstGeom prst="rect">
-                <a:avLst/>
-              </a:prstGeom>
-            </p:spPr>
-          </p:pic>
-        </p:grpSp>
-        <p:pic>
-          <p:nvPicPr>
-            <p:cNvPr id="49" name="Imagen 48"/>
-            <p:cNvPicPr>
-              <a:picLocks noChangeAspect="1"/>
-            </p:cNvPicPr>
-            <p:nvPr/>
-          </p:nvPicPr>
-          <p:blipFill>
-            <a:blip r:embed="rId19"/>
-            <a:stretch>
-              <a:fillRect/>
-            </a:stretch>
-          </p:blipFill>
-          <p:spPr>
-            <a:xfrm>
-              <a:off x="21458486" y="11372850"/>
-              <a:ext cx="3949027" cy="3187507"/>
-            </a:xfrm>
-            <a:prstGeom prst="rect">
-              <a:avLst/>
-            </a:prstGeom>
-          </p:spPr>
-        </p:pic>
-      </p:grpSp>
-      <p:sp>
-        <p:nvSpPr>
-          <p:cNvPr id="71" name="CuadroTexto 70"/>
-          <p:cNvSpPr txBox="1"/>
-          <p:nvPr/>
-        </p:nvSpPr>
-        <p:spPr>
-          <a:xfrm>
-            <a:off x="2805746" y="22797884"/>
-            <a:ext cx="2116413" cy="523220"/>
-          </a:xfrm>
-          <a:prstGeom prst="rect">
-            <a:avLst/>
+        </p:nvSpPr>
+        <p:spPr>
+          <a:xfrm>
+            <a:off x="10108610" y="18359801"/>
+            <a:ext cx="9470243" cy="2762997"/>
+          </a:xfrm>
+          <a:prstGeom prst="wedgeRoundRectCallout">
+            <a:avLst>
+              <a:gd name="adj1" fmla="val 61579"/>
+              <a:gd name="adj2" fmla="val 136945"/>
+              <a:gd name="adj3" fmla="val 16667"/>
+            </a:avLst>
           </a:prstGeom>
           <a:noFill/>
-        </p:spPr>
-        <p:txBody>
-          <a:bodyPr wrap="square" rtlCol="0">
-            <a:spAutoFit/>
-          </a:bodyPr>
-          <a:lstStyle/>
-          <a:p>
-            <a:r>
-              <a:rPr lang="es-ES" sz="2800" dirty="0" smtClean="0"/>
-              <a:t>Binarización</a:t>
-            </a:r>
-            <a:r>
-              <a:rPr lang="es-ES" sz="2800" dirty="0"/>
-              <a:t>.</a:t>
-            </a:r>
-          </a:p>
-        </p:txBody>
-      </p:sp>
-      <p:sp>
-        <p:nvSpPr>
-          <p:cNvPr id="72" name="CuadroTexto 71"/>
-          <p:cNvSpPr txBox="1"/>
-          <p:nvPr/>
-        </p:nvSpPr>
-        <p:spPr>
-          <a:xfrm>
-            <a:off x="12149560" y="11116330"/>
-            <a:ext cx="3809099" cy="523220"/>
-          </a:xfrm>
-          <a:prstGeom prst="rect">
-            <a:avLst/>
-          </a:prstGeom>
-          <a:noFill/>
-        </p:spPr>
-        <p:txBody>
-          <a:bodyPr wrap="square" rtlCol="0">
-            <a:spAutoFit/>
-          </a:bodyPr>
-          <a:lstStyle/>
-          <a:p>
-            <a:r>
-              <a:rPr lang="es-ES" sz="2800" dirty="0" smtClean="0"/>
-              <a:t>Estrías calculadas.</a:t>
-            </a:r>
-            <a:endParaRPr lang="es-ES" sz="2800" dirty="0"/>
-          </a:p>
-        </p:txBody>
-      </p:sp>
-      <p:sp>
-        <p:nvSpPr>
-          <p:cNvPr id="73" name="CuadroTexto 72"/>
-          <p:cNvSpPr txBox="1"/>
-          <p:nvPr/>
-        </p:nvSpPr>
-        <p:spPr>
-          <a:xfrm>
-            <a:off x="17576610" y="12689711"/>
-            <a:ext cx="3480835" cy="954107"/>
-          </a:xfrm>
-          <a:prstGeom prst="rect">
-            <a:avLst/>
-          </a:prstGeom>
-          <a:noFill/>
-        </p:spPr>
-        <p:txBody>
-          <a:bodyPr wrap="square" rtlCol="0">
-            <a:spAutoFit/>
-          </a:bodyPr>
-          <a:lstStyle/>
-          <a:p>
-            <a:r>
-              <a:rPr lang="es-ES" sz="2800" dirty="0" smtClean="0"/>
-              <a:t>Resultados y estadísticos.</a:t>
-            </a:r>
-            <a:endParaRPr lang="es-ES" sz="2800" dirty="0"/>
-          </a:p>
-        </p:txBody>
-      </p:sp>
-      <p:sp>
-        <p:nvSpPr>
-          <p:cNvPr id="74" name="CuadroTexto 73"/>
-          <p:cNvSpPr txBox="1"/>
-          <p:nvPr/>
-        </p:nvSpPr>
-        <p:spPr>
-          <a:xfrm>
-            <a:off x="21599837" y="14428926"/>
-            <a:ext cx="3809099" cy="523220"/>
-          </a:xfrm>
-          <a:prstGeom prst="rect">
-            <a:avLst/>
-          </a:prstGeom>
-          <a:noFill/>
-        </p:spPr>
-        <p:txBody>
-          <a:bodyPr wrap="square" rtlCol="0">
-            <a:spAutoFit/>
-          </a:bodyPr>
-          <a:lstStyle/>
-          <a:p>
-            <a:r>
-              <a:rPr lang="es-ES" sz="2800" dirty="0" smtClean="0"/>
-              <a:t>Clasificación final.</a:t>
-            </a:r>
-            <a:endParaRPr lang="es-ES" sz="2800" dirty="0"/>
-          </a:p>
-        </p:txBody>
-      </p:sp>
-      <p:sp>
-        <p:nvSpPr>
-          <p:cNvPr id="75" name="CuadroTexto 74"/>
-          <p:cNvSpPr txBox="1"/>
-          <p:nvPr/>
-        </p:nvSpPr>
-        <p:spPr>
-          <a:xfrm>
-            <a:off x="628237" y="8362950"/>
-            <a:ext cx="25081477" cy="2677656"/>
-          </a:xfrm>
-          <a:prstGeom prst="rect">
-            <a:avLst/>
-          </a:prstGeom>
-          <a:noFill/>
-        </p:spPr>
-        <p:txBody>
-          <a:bodyPr wrap="square" rtlCol="0">
-            <a:spAutoFit/>
-          </a:bodyPr>
-          <a:lstStyle/>
-          <a:p>
-            <a:r>
-              <a:rPr lang="es-ES" sz="2800" dirty="0" smtClean="0"/>
-              <a:t>El proyecto va a consistir en lograr una estimación de la dieta a partir del análisis de las estrías que la ingesta de alimentos provoca en las piezas dentales.</a:t>
-            </a:r>
-          </a:p>
-          <a:p>
-            <a:r>
-              <a:rPr lang="es-ES" sz="2800" dirty="0" smtClean="0"/>
-              <a:t>Para estimarlo tendremos que abordar una serie de pasos hasta llegar al resultado final.</a:t>
-            </a:r>
-          </a:p>
-          <a:p>
-            <a:r>
-              <a:rPr lang="es-ES" sz="2800" dirty="0" smtClean="0"/>
-              <a:t>La aplicación contendrá tres modos diferenciados: </a:t>
-            </a:r>
-          </a:p>
-          <a:p>
-            <a:r>
-              <a:rPr lang="es-ES" sz="2800" b="1" dirty="0" smtClean="0"/>
-              <a:t>1- Modo semiautomático: </a:t>
-            </a:r>
-            <a:r>
-              <a:rPr lang="es-ES" sz="2800" dirty="0" smtClean="0"/>
-              <a:t>En este modo las estrías ya han sido pintadas por un experto y la aplicación las detectara y calculara los estadísticos.</a:t>
-            </a:r>
-          </a:p>
-          <a:p>
-            <a:r>
-              <a:rPr lang="es-ES" sz="2800" b="1" dirty="0" smtClean="0"/>
-              <a:t>2- Modo Manual: </a:t>
-            </a:r>
-            <a:r>
-              <a:rPr lang="es-ES" sz="2800" dirty="0" smtClean="0"/>
-              <a:t>Este modo sirve para pintar las estrías desde cero o editar las que han sido detectadas por los otros modos.</a:t>
-            </a:r>
-          </a:p>
-          <a:p>
-            <a:r>
-              <a:rPr lang="es-ES" sz="2800" b="1" dirty="0" smtClean="0"/>
-              <a:t>3- Modo Automático: </a:t>
-            </a:r>
-            <a:r>
-              <a:rPr lang="es-ES" sz="2800" dirty="0" smtClean="0"/>
-              <a:t>Este modo detectara estrías en imágenes que no tengan nada pintado y sirve para ayudar a comenzar a un experto a detectarlas.</a:t>
-            </a:r>
-            <a:endParaRPr lang="es-ES" sz="2800" dirty="0"/>
-          </a:p>
-        </p:txBody>
-      </p:sp>
-      <p:sp>
-        <p:nvSpPr>
-          <p:cNvPr id="69" name="CuadroTexto 68"/>
-          <p:cNvSpPr txBox="1"/>
-          <p:nvPr/>
-        </p:nvSpPr>
-        <p:spPr>
-          <a:xfrm>
-            <a:off x="7805967" y="15207352"/>
-            <a:ext cx="8980448" cy="1154932"/>
-          </a:xfrm>
-          <a:prstGeom prst="rect">
-            <a:avLst/>
-          </a:prstGeom>
-          <a:noFill/>
-        </p:spPr>
-        <p:txBody>
-          <a:bodyPr wrap="square" rtlCol="0">
-            <a:spAutoFit/>
-          </a:bodyPr>
-          <a:lstStyle/>
-          <a:p>
-            <a:r>
-              <a:rPr lang="es-ES" dirty="0" smtClean="0"/>
-              <a:t>Modo semiautomático.</a:t>
-            </a:r>
-            <a:endParaRPr lang="es-ES" dirty="0"/>
-          </a:p>
-        </p:txBody>
-      </p:sp>
-      <p:pic>
-        <p:nvPicPr>
-          <p:cNvPr id="70" name="Imagen 69"/>
-          <p:cNvPicPr>
-            <a:picLocks noChangeAspect="1"/>
-          </p:cNvPicPr>
-          <p:nvPr/>
-        </p:nvPicPr>
-        <p:blipFill>
-          <a:blip r:embed="rId20"/>
-          <a:stretch>
-            <a:fillRect/>
-          </a:stretch>
-        </p:blipFill>
-        <p:spPr>
-          <a:xfrm>
-            <a:off x="1049709" y="17853488"/>
-            <a:ext cx="4536098" cy="3681179"/>
-          </a:xfrm>
-          <a:prstGeom prst="rect">
-            <a:avLst/>
-          </a:prstGeom>
-        </p:spPr>
-      </p:pic>
-      <p:sp>
-        <p:nvSpPr>
-          <p:cNvPr id="79" name="CuadroTexto 78"/>
-          <p:cNvSpPr txBox="1"/>
-          <p:nvPr/>
-        </p:nvSpPr>
-        <p:spPr>
-          <a:xfrm>
-            <a:off x="913093" y="16242628"/>
-            <a:ext cx="4457820" cy="1384995"/>
-          </a:xfrm>
-          <a:prstGeom prst="rect">
-            <a:avLst/>
-          </a:prstGeom>
-          <a:noFill/>
-        </p:spPr>
-        <p:txBody>
-          <a:bodyPr wrap="square" rtlCol="0">
-            <a:spAutoFit/>
-          </a:bodyPr>
-          <a:lstStyle/>
-          <a:p>
-            <a:r>
-              <a:rPr lang="es-ES" sz="2800" dirty="0" smtClean="0"/>
-              <a:t>El usuario carga una imagen en la aplicación y selecciona el color.</a:t>
-            </a:r>
-            <a:endParaRPr lang="es-ES" sz="2800" dirty="0"/>
-          </a:p>
-        </p:txBody>
-      </p:sp>
-      <p:sp>
-        <p:nvSpPr>
-          <p:cNvPr id="80" name="Flecha a la derecha con bandas 79"/>
-          <p:cNvSpPr/>
-          <p:nvPr/>
-        </p:nvSpPr>
-        <p:spPr>
-          <a:xfrm>
-            <a:off x="6011064" y="18021912"/>
-            <a:ext cx="8657436" cy="2080220"/>
-          </a:xfrm>
-          <a:prstGeom prst="stripedRightArrow">
-            <a:avLst>
-              <a:gd name="adj1" fmla="val 60823"/>
-              <a:gd name="adj2" fmla="val 50000"/>
-            </a:avLst>
-          </a:prstGeom>
-          <a:solidFill>
-            <a:schemeClr val="bg1">
-              <a:lumMod val="75000"/>
-            </a:schemeClr>
-          </a:solidFill>
-          <a:ln>
-            <a:noFill/>
+          <a:ln w="25400">
+            <a:solidFill>
+              <a:schemeClr val="tx1"/>
+            </a:solidFill>
           </a:ln>
         </p:spPr>
         <p:style>
@@ -4760,16 +4799,40 @@
           </a:p>
         </p:txBody>
       </p:sp>
-      <p:sp>
-        <p:nvSpPr>
-          <p:cNvPr id="82" name="CuadroTexto 81"/>
+      <p:pic>
+        <p:nvPicPr>
+          <p:cNvPr id="1042" name="Imagen 1041"/>
+          <p:cNvPicPr>
+            <a:picLocks noChangeAspect="1"/>
+          </p:cNvPicPr>
+          <p:nvPr/>
+        </p:nvPicPr>
+        <p:blipFill>
+          <a:blip r:embed="rId18"/>
+          <a:stretch>
+            <a:fillRect/>
+          </a:stretch>
+        </p:blipFill>
+        <p:spPr>
+          <a:xfrm>
+            <a:off x="700489" y="9638026"/>
+            <a:ext cx="4348662" cy="4054705"/>
+          </a:xfrm>
+          <a:prstGeom prst="rect">
+            <a:avLst/>
+          </a:prstGeom>
+        </p:spPr>
+      </p:pic>
+      <p:sp>
+        <p:nvSpPr>
+          <p:cNvPr id="173" name="CuadroTexto 172"/>
           <p:cNvSpPr txBox="1"/>
           <p:nvPr/>
         </p:nvSpPr>
         <p:spPr>
           <a:xfrm>
-            <a:off x="6965628" y="18372005"/>
-            <a:ext cx="6347568" cy="1384995"/>
+            <a:off x="628237" y="8889680"/>
+            <a:ext cx="7686425" cy="707886"/>
           </a:xfrm>
           <a:prstGeom prst="rect">
             <a:avLst/>
@@ -4783,16 +4846,64 @@
           <a:lstStyle/>
           <a:p>
             <a:r>
-              <a:rPr lang="es-ES" sz="2800" dirty="0" smtClean="0"/>
-              <a:t>Una vez que el usuario ha seleccionado el color podremos proceder a calcular las estrías y sus estadísticas.</a:t>
-            </a:r>
-            <a:endParaRPr lang="es-ES" sz="2800" dirty="0"/>
+              <a:rPr lang="es-ES" sz="4000" dirty="0" smtClean="0"/>
+              <a:t>Estrías pintadas por experto</a:t>
+            </a:r>
+            <a:endParaRPr lang="es-ES" sz="4000" dirty="0"/>
           </a:p>
         </p:txBody>
       </p:sp>
       <p:pic>
         <p:nvPicPr>
-          <p:cNvPr id="77" name="Imagen 76"/>
+          <p:cNvPr id="1043" name="Imagen 1042"/>
+          <p:cNvPicPr>
+            <a:picLocks noChangeAspect="1"/>
+          </p:cNvPicPr>
+          <p:nvPr/>
+        </p:nvPicPr>
+        <p:blipFill>
+          <a:blip r:embed="rId19"/>
+          <a:stretch>
+            <a:fillRect/>
+          </a:stretch>
+        </p:blipFill>
+        <p:spPr>
+          <a:xfrm>
+            <a:off x="7779671" y="9530571"/>
+            <a:ext cx="4172734" cy="4153177"/>
+          </a:xfrm>
+          <a:prstGeom prst="rect">
+            <a:avLst/>
+          </a:prstGeom>
+        </p:spPr>
+      </p:pic>
+      <p:pic>
+        <p:nvPicPr>
+          <p:cNvPr id="175" name="Imagen 174"/>
+          <p:cNvPicPr>
+            <a:picLocks noChangeAspect="1"/>
+          </p:cNvPicPr>
+          <p:nvPr/>
+        </p:nvPicPr>
+        <p:blipFill>
+          <a:blip r:embed="rId20"/>
+          <a:stretch>
+            <a:fillRect/>
+          </a:stretch>
+        </p:blipFill>
+        <p:spPr>
+          <a:xfrm>
+            <a:off x="24794650" y="9547278"/>
+            <a:ext cx="4556839" cy="4086812"/>
+          </a:xfrm>
+          <a:prstGeom prst="rect">
+            <a:avLst/>
+          </a:prstGeom>
+        </p:spPr>
+      </p:pic>
+      <p:pic>
+        <p:nvPicPr>
+          <p:cNvPr id="176" name="Imagen 175"/>
           <p:cNvPicPr>
             <a:picLocks noChangeAspect="1"/>
           </p:cNvPicPr>
@@ -4806,72 +4917,107 @@
         </p:blipFill>
         <p:spPr>
           <a:xfrm>
-            <a:off x="15552685" y="17853488"/>
-            <a:ext cx="4536098" cy="3681179"/>
+            <a:off x="18432404" y="10255933"/>
+            <a:ext cx="4320839" cy="2933920"/>
           </a:xfrm>
           <a:prstGeom prst="rect">
             <a:avLst/>
           </a:prstGeom>
         </p:spPr>
       </p:pic>
-      <p:sp>
-        <p:nvSpPr>
-          <p:cNvPr id="84" name="CuadroTexto 83"/>
-          <p:cNvSpPr txBox="1"/>
+      <p:pic>
+        <p:nvPicPr>
+          <p:cNvPr id="1045" name="Imagen 1044"/>
+          <p:cNvPicPr>
+            <a:picLocks noChangeAspect="1"/>
+          </p:cNvPicPr>
           <p:nvPr/>
-        </p:nvSpPr>
-        <p:spPr>
-          <a:xfrm>
-            <a:off x="20333493" y="17230020"/>
-            <a:ext cx="9666570" cy="3108543"/>
+        </p:nvPicPr>
+        <p:blipFill>
+          <a:blip r:embed="rId22"/>
+          <a:stretch>
+            <a:fillRect/>
+          </a:stretch>
+        </p:blipFill>
+        <p:spPr>
+          <a:xfrm>
+            <a:off x="21402555" y="14580941"/>
+            <a:ext cx="8280806" cy="6720122"/>
           </a:xfrm>
           <a:prstGeom prst="rect">
             <a:avLst/>
           </a:prstGeom>
-          <a:noFill/>
-        </p:spPr>
-        <p:txBody>
-          <a:bodyPr wrap="square" rtlCol="0">
-            <a:spAutoFit/>
-          </a:bodyPr>
-          <a:lstStyle/>
-          <a:p>
-            <a:r>
-              <a:rPr lang="es-ES" sz="2800" dirty="0" smtClean="0"/>
-              <a:t>La pantalla que aparecerá cuando calculemos las estrías será esta, desde aquí podremos editar las estrías obtenidas añadiendo o borrando las que considere el experto apropiadas.</a:t>
-            </a:r>
-          </a:p>
-          <a:p>
-            <a:endParaRPr lang="es-ES" sz="2800" dirty="0"/>
-          </a:p>
-          <a:p>
-            <a:r>
-              <a:rPr lang="es-ES" sz="2800" dirty="0" smtClean="0"/>
-              <a:t>Cuando tenemos las estrías calculadas podremos guardar los datos para obtener las estadísticas y el punto donde se podrá situar la dieta que el individuo llevaba.</a:t>
-            </a:r>
-            <a:endParaRPr lang="es-ES" sz="2800" dirty="0"/>
-          </a:p>
-        </p:txBody>
-      </p:sp>
-      <p:sp>
-        <p:nvSpPr>
-          <p:cNvPr id="83" name="Elipse 82"/>
+        </p:spPr>
+      </p:pic>
+      <p:pic>
+        <p:nvPicPr>
+          <p:cNvPr id="1046" name="Imagen 1045"/>
+          <p:cNvPicPr>
+            <a:picLocks noChangeAspect="1"/>
+          </p:cNvPicPr>
+          <p:nvPr/>
+        </p:nvPicPr>
+        <p:blipFill>
+          <a:blip r:embed="rId23"/>
+          <a:stretch>
+            <a:fillRect/>
+          </a:stretch>
+        </p:blipFill>
+        <p:spPr>
+          <a:xfrm>
+            <a:off x="10390120" y="18998831"/>
+            <a:ext cx="3021938" cy="1552497"/>
+          </a:xfrm>
+          <a:prstGeom prst="rect">
+            <a:avLst/>
+          </a:prstGeom>
+        </p:spPr>
+      </p:pic>
+      <p:pic>
+        <p:nvPicPr>
+          <p:cNvPr id="158" name="Imagen 157"/>
+          <p:cNvPicPr>
+            <a:picLocks noChangeAspect="1"/>
+          </p:cNvPicPr>
+          <p:nvPr/>
+        </p:nvPicPr>
+        <p:blipFill>
+          <a:blip r:embed="rId24"/>
+          <a:stretch>
+            <a:fillRect/>
+          </a:stretch>
+        </p:blipFill>
+        <p:spPr>
+          <a:xfrm>
+            <a:off x="939245" y="14562487"/>
+            <a:ext cx="8251390" cy="6696250"/>
+          </a:xfrm>
+          <a:prstGeom prst="rect">
+            <a:avLst/>
+          </a:prstGeom>
+        </p:spPr>
+      </p:pic>
+      <p:sp>
+        <p:nvSpPr>
+          <p:cNvPr id="204" name="Flecha derecha 203"/>
           <p:cNvSpPr/>
           <p:nvPr/>
         </p:nvSpPr>
         <p:spPr>
-          <a:xfrm>
-            <a:off x="1049710" y="21957458"/>
-            <a:ext cx="13388576" cy="6312742"/>
-          </a:xfrm>
-          <a:prstGeom prst="ellipse">
+          <a:xfrm rot="3323942">
+            <a:off x="2246760" y="21956519"/>
+            <a:ext cx="2013339" cy="1675467"/>
+          </a:xfrm>
+          <a:prstGeom prst="rightArrow">
             <a:avLst/>
           </a:prstGeom>
-          <a:noFill/>
-          <a:ln w="34925">
-            <a:solidFill>
-              <a:schemeClr val="tx1"/>
-            </a:solidFill>
+          <a:solidFill>
+            <a:schemeClr val="bg1">
+              <a:lumMod val="75000"/>
+            </a:schemeClr>
+          </a:solidFill>
+          <a:ln>
+            <a:noFill/>
           </a:ln>
         </p:spPr>
         <p:style>
@@ -4899,119 +5045,27 @@
           </a:p>
         </p:txBody>
       </p:sp>
-      <p:pic>
-        <p:nvPicPr>
-          <p:cNvPr id="87" name="Imagen 86"/>
-          <p:cNvPicPr>
-            <a:picLocks noChangeAspect="1"/>
-          </p:cNvPicPr>
+      <p:sp>
+        <p:nvSpPr>
+          <p:cNvPr id="205" name="Flecha derecha 204"/>
+          <p:cNvSpPr/>
           <p:nvPr/>
-        </p:nvPicPr>
-        <p:blipFill>
-          <a:blip r:embed="rId22">
-            <a:extLst>
-              <a:ext uri="{28A0092B-C50C-407E-A947-70E740481C1C}">
-                <a14:useLocalDpi xmlns:a14="http://schemas.microsoft.com/office/drawing/2010/main" val="0"/>
-              </a:ext>
-            </a:extLst>
-          </a:blip>
-          <a:stretch>
-            <a:fillRect/>
-          </a:stretch>
-        </p:blipFill>
-        <p:spPr>
-          <a:xfrm>
-            <a:off x="2377442" y="23257858"/>
-            <a:ext cx="1818906" cy="1769747"/>
-          </a:xfrm>
-          <a:prstGeom prst="rect">
+        </p:nvSpPr>
+        <p:spPr>
+          <a:xfrm rot="18905955">
+            <a:off x="25458473" y="22057824"/>
+            <a:ext cx="2013339" cy="1675467"/>
+          </a:xfrm>
+          <a:prstGeom prst="rightArrow">
             <a:avLst/>
           </a:prstGeom>
-        </p:spPr>
-      </p:pic>
-      <p:pic>
-        <p:nvPicPr>
-          <p:cNvPr id="88" name="Imagen 87"/>
-          <p:cNvPicPr>
-            <a:picLocks noChangeAspect="1"/>
-          </p:cNvPicPr>
-          <p:nvPr/>
-        </p:nvPicPr>
-        <p:blipFill>
-          <a:blip r:embed="rId23">
-            <a:extLst>
-              <a:ext uri="{28A0092B-C50C-407E-A947-70E740481C1C}">
-                <a14:useLocalDpi xmlns:a14="http://schemas.microsoft.com/office/drawing/2010/main" val="0"/>
-              </a:ext>
-            </a:extLst>
-          </a:blip>
-          <a:stretch>
-            <a:fillRect/>
-          </a:stretch>
-        </p:blipFill>
-        <p:spPr>
-          <a:xfrm>
-            <a:off x="4424976" y="25285682"/>
-            <a:ext cx="1878221" cy="1769747"/>
-          </a:xfrm>
-          <a:prstGeom prst="rect">
-            <a:avLst/>
-          </a:prstGeom>
-        </p:spPr>
-      </p:pic>
-      <p:pic>
-        <p:nvPicPr>
-          <p:cNvPr id="89" name="Imagen 88"/>
-          <p:cNvPicPr>
-            <a:picLocks noChangeAspect="1"/>
-          </p:cNvPicPr>
-          <p:nvPr/>
-        </p:nvPicPr>
-        <p:blipFill>
-          <a:blip r:embed="rId24">
-            <a:extLst>
-              <a:ext uri="{28A0092B-C50C-407E-A947-70E740481C1C}">
-                <a14:useLocalDpi xmlns:a14="http://schemas.microsoft.com/office/drawing/2010/main" val="0"/>
-              </a:ext>
-            </a:extLst>
-          </a:blip>
-          <a:stretch>
-            <a:fillRect/>
-          </a:stretch>
-        </p:blipFill>
-        <p:spPr>
-          <a:xfrm>
-            <a:off x="6665307" y="23130055"/>
-            <a:ext cx="1794761" cy="1777883"/>
-          </a:xfrm>
-          <a:prstGeom prst="rect">
-            <a:avLst/>
-          </a:prstGeom>
-        </p:spPr>
-      </p:pic>
-      <p:sp>
-        <p:nvSpPr>
-          <p:cNvPr id="90" name="Llamada rectangular redondeada 89"/>
-          <p:cNvSpPr/>
-          <p:nvPr/>
-        </p:nvSpPr>
-        <p:spPr>
-          <a:xfrm>
-            <a:off x="6845799" y="25256533"/>
-            <a:ext cx="4309603" cy="2637739"/>
-          </a:xfrm>
-          <a:prstGeom prst="wedgeRoundRectCallout">
-            <a:avLst>
-              <a:gd name="adj1" fmla="val -44377"/>
-              <a:gd name="adj2" fmla="val -102423"/>
-              <a:gd name="adj3" fmla="val 16667"/>
-            </a:avLst>
-          </a:prstGeom>
-          <a:noFill/>
-          <a:ln w="25400">
-            <a:solidFill>
-              <a:schemeClr val="tx1"/>
-            </a:solidFill>
+          <a:solidFill>
+            <a:schemeClr val="bg1">
+              <a:lumMod val="75000"/>
+            </a:schemeClr>
+          </a:solidFill>
+          <a:ln>
+            <a:noFill/>
           </a:ln>
         </p:spPr>
         <p:style>
@@ -5039,81 +5093,87 @@
           </a:p>
         </p:txBody>
       </p:sp>
-      <p:pic>
-        <p:nvPicPr>
-          <p:cNvPr id="91" name="Imagen 90"/>
-          <p:cNvPicPr>
-            <a:picLocks noChangeAspect="1"/>
-          </p:cNvPicPr>
+      <p:sp>
+        <p:nvSpPr>
+          <p:cNvPr id="207" name="CuadroTexto 206"/>
+          <p:cNvSpPr txBox="1"/>
           <p:nvPr/>
-        </p:nvPicPr>
-        <p:blipFill>
-          <a:blip r:embed="rId25">
-            <a:extLst>
-              <a:ext uri="{28A0092B-C50C-407E-A947-70E740481C1C}">
-                <a14:useLocalDpi xmlns:a14="http://schemas.microsoft.com/office/drawing/2010/main" val="0"/>
-              </a:ext>
-            </a:extLst>
-          </a:blip>
-          <a:stretch>
-            <a:fillRect/>
-          </a:stretch>
-        </p:blipFill>
-        <p:spPr>
-          <a:xfrm>
-            <a:off x="6965628" y="25432475"/>
-            <a:ext cx="2256018" cy="1161325"/>
+        </p:nvSpPr>
+        <p:spPr>
+          <a:xfrm>
+            <a:off x="10453682" y="20449532"/>
+            <a:ext cx="3012392" cy="707886"/>
           </a:xfrm>
           <a:prstGeom prst="rect">
             <a:avLst/>
           </a:prstGeom>
-        </p:spPr>
-      </p:pic>
-      <p:pic>
-        <p:nvPicPr>
-          <p:cNvPr id="93" name="Imagen 92"/>
-          <p:cNvPicPr>
-            <a:picLocks noChangeAspect="1"/>
-          </p:cNvPicPr>
+          <a:noFill/>
+        </p:spPr>
+        <p:txBody>
+          <a:bodyPr wrap="square" rtlCol="0">
+            <a:spAutoFit/>
+          </a:bodyPr>
+          <a:lstStyle/>
+          <a:p>
+            <a:pPr algn="ctr"/>
+            <a:r>
+              <a:rPr lang="es-ES" sz="4000" dirty="0" smtClean="0"/>
+              <a:t>Segmentos</a:t>
+            </a:r>
+          </a:p>
+        </p:txBody>
+      </p:sp>
+      <p:sp>
+        <p:nvSpPr>
+          <p:cNvPr id="208" name="CuadroTexto 207"/>
+          <p:cNvSpPr txBox="1"/>
           <p:nvPr/>
-        </p:nvPicPr>
-        <p:blipFill>
-          <a:blip r:embed="rId26"/>
-          <a:stretch>
-            <a:fillRect/>
-          </a:stretch>
-        </p:blipFill>
-        <p:spPr>
-          <a:xfrm>
-            <a:off x="10428642" y="22762296"/>
-            <a:ext cx="1787386" cy="1769747"/>
+        </p:nvSpPr>
+        <p:spPr>
+          <a:xfrm>
+            <a:off x="16822050" y="20415029"/>
+            <a:ext cx="2248281" cy="707886"/>
           </a:xfrm>
           <a:prstGeom prst="rect">
             <a:avLst/>
           </a:prstGeom>
-        </p:spPr>
-      </p:pic>
-      <p:sp>
-        <p:nvSpPr>
-          <p:cNvPr id="96" name="Flecha derecha 95"/>
+          <a:noFill/>
+        </p:spPr>
+        <p:txBody>
+          <a:bodyPr wrap="square" rtlCol="0">
+            <a:spAutoFit/>
+          </a:bodyPr>
+          <a:lstStyle/>
+          <a:p>
+            <a:pPr algn="ctr"/>
+            <a:r>
+              <a:rPr lang="es-ES" sz="4000" dirty="0" smtClean="0"/>
+              <a:t>Grafo</a:t>
+            </a:r>
+          </a:p>
+        </p:txBody>
+      </p:sp>
+      <p:sp>
+        <p:nvSpPr>
+          <p:cNvPr id="210" name="Rectángulo 209"/>
           <p:cNvSpPr/>
           <p:nvPr/>
         </p:nvSpPr>
         <p:spPr>
-          <a:xfrm rot="3062868">
-            <a:off x="3864028" y="25001500"/>
-            <a:ext cx="737285" cy="717971"/>
-          </a:xfrm>
-          <a:prstGeom prst="rightArrow">
+          <a:xfrm>
+            <a:off x="418221" y="27621431"/>
+            <a:ext cx="29581841" cy="6844402"/>
+          </a:xfrm>
+          <a:prstGeom prst="rect">
             <a:avLst/>
           </a:prstGeom>
           <a:solidFill>
-            <a:schemeClr val="bg1">
-              <a:lumMod val="75000"/>
-            </a:schemeClr>
+            <a:schemeClr val="bg1"/>
           </a:solidFill>
-          <a:ln>
-            <a:noFill/>
+          <a:ln w="311150" cmpd="sng">
+            <a:solidFill>
+              <a:srgbClr val="00B0F0"/>
+            </a:solidFill>
           </a:ln>
         </p:spPr>
         <p:style>
@@ -5143,17 +5203,293 @@
       </p:sp>
       <p:sp>
         <p:nvSpPr>
-          <p:cNvPr id="100" name="Flecha derecha 99"/>
+          <p:cNvPr id="217" name="CuadroTexto 216"/>
+          <p:cNvSpPr txBox="1"/>
+          <p:nvPr/>
+        </p:nvSpPr>
+        <p:spPr>
+          <a:xfrm>
+            <a:off x="497103" y="27833254"/>
+            <a:ext cx="29104512" cy="1154932"/>
+          </a:xfrm>
+          <a:prstGeom prst="rect">
+            <a:avLst/>
+          </a:prstGeom>
+          <a:noFill/>
+        </p:spPr>
+        <p:txBody>
+          <a:bodyPr wrap="square" rtlCol="0">
+            <a:spAutoFit/>
+          </a:bodyPr>
+          <a:lstStyle/>
+          <a:p>
+            <a:pPr algn="ctr"/>
+            <a:r>
+              <a:rPr lang="es-ES" dirty="0" smtClean="0"/>
+              <a:t>Modo automático</a:t>
+            </a:r>
+            <a:endParaRPr lang="es-ES" dirty="0"/>
+          </a:p>
+        </p:txBody>
+      </p:sp>
+      <p:grpSp>
+        <p:nvGrpSpPr>
+          <p:cNvPr id="219" name="Grupo 218"/>
+          <p:cNvGrpSpPr/>
+          <p:nvPr/>
+        </p:nvGrpSpPr>
+        <p:grpSpPr>
+          <a:xfrm>
+            <a:off x="377551" y="34437381"/>
+            <a:ext cx="29622511" cy="3094814"/>
+            <a:chOff x="15286089" y="21954820"/>
+            <a:chExt cx="14984360" cy="6844402"/>
+          </a:xfrm>
+          <a:solidFill>
+            <a:schemeClr val="bg1"/>
+          </a:solidFill>
+        </p:grpSpPr>
+        <p:sp>
+          <p:nvSpPr>
+            <p:cNvPr id="220" name="Rectángulo 219"/>
+            <p:cNvSpPr/>
+            <p:nvPr/>
+          </p:nvSpPr>
+          <p:spPr>
+            <a:xfrm>
+              <a:off x="15286089" y="21954820"/>
+              <a:ext cx="14984360" cy="6844402"/>
+            </a:xfrm>
+            <a:prstGeom prst="rect">
+              <a:avLst/>
+            </a:prstGeom>
+            <a:grpFill/>
+            <a:ln w="311150" cmpd="sng">
+              <a:solidFill>
+                <a:srgbClr val="00B0F0"/>
+              </a:solidFill>
+            </a:ln>
+          </p:spPr>
+          <p:style>
+            <a:lnRef idx="2">
+              <a:schemeClr val="accent1">
+                <a:shade val="50000"/>
+              </a:schemeClr>
+            </a:lnRef>
+            <a:fillRef idx="1">
+              <a:schemeClr val="accent1"/>
+            </a:fillRef>
+            <a:effectRef idx="0">
+              <a:schemeClr val="accent1"/>
+            </a:effectRef>
+            <a:fontRef idx="minor">
+              <a:schemeClr val="lt1"/>
+            </a:fontRef>
+          </p:style>
+          <p:txBody>
+            <a:bodyPr rtlCol="0" anchor="ctr"/>
+            <a:lstStyle/>
+            <a:p>
+              <a:pPr algn="ctr"/>
+              <a:endParaRPr lang="es-ES"/>
+            </a:p>
+          </p:txBody>
+        </p:sp>
+        <p:sp>
+          <p:nvSpPr>
+            <p:cNvPr id="221" name="CuadroTexto 220"/>
+            <p:cNvSpPr txBox="1"/>
+            <p:nvPr/>
+          </p:nvSpPr>
+          <p:spPr>
+            <a:xfrm>
+              <a:off x="15407881" y="22542979"/>
+              <a:ext cx="14800498" cy="2554215"/>
+            </a:xfrm>
+            <a:prstGeom prst="rect">
+              <a:avLst/>
+            </a:prstGeom>
+            <a:noFill/>
+          </p:spPr>
+          <p:txBody>
+            <a:bodyPr wrap="square" rtlCol="0">
+              <a:spAutoFit/>
+            </a:bodyPr>
+            <a:lstStyle/>
+            <a:p>
+              <a:pPr algn="ctr"/>
+              <a:r>
+                <a:rPr lang="es-ES" dirty="0" smtClean="0"/>
+                <a:t>Modo Manual</a:t>
+              </a:r>
+              <a:endParaRPr lang="es-ES" dirty="0"/>
+            </a:p>
+          </p:txBody>
+        </p:sp>
+      </p:grpSp>
+      <p:pic>
+        <p:nvPicPr>
+          <p:cNvPr id="159" name="Imagen 158"/>
+          <p:cNvPicPr>
+            <a:picLocks noChangeAspect="1"/>
+          </p:cNvPicPr>
+          <p:nvPr/>
+        </p:nvPicPr>
+        <p:blipFill>
+          <a:blip r:embed="rId25"/>
+          <a:stretch>
+            <a:fillRect/>
+          </a:stretch>
+        </p:blipFill>
+        <p:spPr>
+          <a:xfrm>
+            <a:off x="939245" y="28518009"/>
+            <a:ext cx="7007104" cy="5686475"/>
+          </a:xfrm>
+          <a:prstGeom prst="rect">
+            <a:avLst/>
+          </a:prstGeom>
+        </p:spPr>
+      </p:pic>
+      <p:pic>
+        <p:nvPicPr>
+          <p:cNvPr id="163" name="Imagen 162"/>
+          <p:cNvPicPr>
+            <a:picLocks noChangeAspect="1"/>
+          </p:cNvPicPr>
+          <p:nvPr/>
+        </p:nvPicPr>
+        <p:blipFill>
+          <a:blip r:embed="rId26"/>
+          <a:stretch>
+            <a:fillRect/>
+          </a:stretch>
+        </p:blipFill>
+        <p:spPr>
+          <a:xfrm>
+            <a:off x="22276435" y="28481775"/>
+            <a:ext cx="6975724" cy="5661009"/>
+          </a:xfrm>
+          <a:prstGeom prst="rect">
+            <a:avLst/>
+          </a:prstGeom>
+        </p:spPr>
+      </p:pic>
+      <p:sp>
+        <p:nvSpPr>
+          <p:cNvPr id="228" name="CuadroTexto 227"/>
+          <p:cNvSpPr txBox="1"/>
+          <p:nvPr/>
+        </p:nvSpPr>
+        <p:spPr>
+          <a:xfrm>
+            <a:off x="-666552" y="27821689"/>
+            <a:ext cx="7755008" cy="707886"/>
+          </a:xfrm>
+          <a:prstGeom prst="rect">
+            <a:avLst/>
+          </a:prstGeom>
+          <a:noFill/>
+        </p:spPr>
+        <p:txBody>
+          <a:bodyPr wrap="square" rtlCol="0">
+            <a:spAutoFit/>
+          </a:bodyPr>
+          <a:lstStyle/>
+          <a:p>
+            <a:pPr algn="ctr"/>
+            <a:r>
+              <a:rPr lang="es-ES" sz="4000" dirty="0" smtClean="0"/>
+              <a:t>Imagen original</a:t>
+            </a:r>
+            <a:endParaRPr lang="es-ES" sz="4000" dirty="0"/>
+          </a:p>
+        </p:txBody>
+      </p:sp>
+      <p:sp>
+        <p:nvSpPr>
+          <p:cNvPr id="229" name="CuadroTexto 228"/>
+          <p:cNvSpPr txBox="1"/>
+          <p:nvPr/>
+        </p:nvSpPr>
+        <p:spPr>
+          <a:xfrm>
+            <a:off x="21877988" y="27854699"/>
+            <a:ext cx="7239860" cy="707886"/>
+          </a:xfrm>
+          <a:prstGeom prst="rect">
+            <a:avLst/>
+          </a:prstGeom>
+          <a:noFill/>
+        </p:spPr>
+        <p:txBody>
+          <a:bodyPr wrap="square" rtlCol="0">
+            <a:spAutoFit/>
+          </a:bodyPr>
+          <a:lstStyle/>
+          <a:p>
+            <a:pPr algn="ctr"/>
+            <a:r>
+              <a:rPr lang="es-ES" sz="4000" dirty="0" smtClean="0"/>
+              <a:t>Contenidas en el cuadrado</a:t>
+            </a:r>
+            <a:endParaRPr lang="es-ES" sz="4000" dirty="0"/>
+          </a:p>
+        </p:txBody>
+      </p:sp>
+      <p:sp>
+        <p:nvSpPr>
+          <p:cNvPr id="230" name="CuadroTexto 229"/>
+          <p:cNvSpPr txBox="1"/>
+          <p:nvPr/>
+        </p:nvSpPr>
+        <p:spPr>
+          <a:xfrm>
+            <a:off x="628237" y="36369497"/>
+            <a:ext cx="29371826" cy="923330"/>
+          </a:xfrm>
+          <a:prstGeom prst="rect">
+            <a:avLst/>
+          </a:prstGeom>
+          <a:noFill/>
+        </p:spPr>
+        <p:txBody>
+          <a:bodyPr wrap="square" rtlCol="0">
+            <a:spAutoFit/>
+          </a:bodyPr>
+          <a:lstStyle/>
+          <a:p>
+            <a:r>
+              <a:rPr lang="es-ES" sz="5400" dirty="0" smtClean="0"/>
+              <a:t>Este modo permite añadir</a:t>
+            </a:r>
+            <a:r>
+              <a:rPr lang="es-ES" sz="5400" dirty="0"/>
+              <a:t> </a:t>
+            </a:r>
+            <a:r>
+              <a:rPr lang="es-ES" sz="5400" dirty="0" smtClean="0"/>
+              <a:t>y borrar estrías manualmente sobre la imagen como elija el usuario.</a:t>
+            </a:r>
+          </a:p>
+        </p:txBody>
+      </p:sp>
+      <p:sp>
+        <p:nvSpPr>
+          <p:cNvPr id="231" name="Flecha a la derecha con bandas 230"/>
           <p:cNvSpPr/>
           <p:nvPr/>
         </p:nvSpPr>
         <p:spPr>
-          <a:xfrm rot="18964807">
-            <a:off x="6085402" y="24854099"/>
-            <a:ext cx="737285" cy="717971"/>
-          </a:xfrm>
-          <a:prstGeom prst="rightArrow">
-            <a:avLst/>
+          <a:xfrm>
+            <a:off x="22885715" y="11201733"/>
+            <a:ext cx="1406853" cy="1354047"/>
+          </a:xfrm>
+          <a:prstGeom prst="stripedRightArrow">
+            <a:avLst>
+              <a:gd name="adj1" fmla="val 60823"/>
+              <a:gd name="adj2" fmla="val 50000"/>
+            </a:avLst>
           </a:prstGeom>
           <a:solidFill>
             <a:schemeClr val="bg1">
@@ -5191,17 +5527,20 @@
       </p:sp>
       <p:sp>
         <p:nvSpPr>
-          <p:cNvPr id="101" name="Flecha derecha 100"/>
+          <p:cNvPr id="81" name="Flecha a la derecha con bandas 80"/>
           <p:cNvSpPr/>
           <p:nvPr/>
         </p:nvSpPr>
         <p:spPr>
-          <a:xfrm rot="20295997">
-            <a:off x="8959121" y="23703657"/>
-            <a:ext cx="1449579" cy="717971"/>
-          </a:xfrm>
-          <a:prstGeom prst="rightArrow">
-            <a:avLst/>
+          <a:xfrm>
+            <a:off x="9378291" y="30440351"/>
+            <a:ext cx="11036603" cy="2080220"/>
+          </a:xfrm>
+          <a:prstGeom prst="stripedRightArrow">
+            <a:avLst>
+              <a:gd name="adj1" fmla="val 60823"/>
+              <a:gd name="adj2" fmla="val 50000"/>
+            </a:avLst>
           </a:prstGeom>
           <a:solidFill>
             <a:schemeClr val="bg1">
@@ -5239,14 +5578,14 @@
       </p:sp>
       <p:sp>
         <p:nvSpPr>
-          <p:cNvPr id="102" name="CuadroTexto 101"/>
+          <p:cNvPr id="83" name="CuadroTexto 82"/>
           <p:cNvSpPr txBox="1"/>
           <p:nvPr/>
         </p:nvSpPr>
         <p:spPr>
           <a:xfrm>
-            <a:off x="20043184" y="21936085"/>
-            <a:ext cx="8980448" cy="1154932"/>
+            <a:off x="9695995" y="30915674"/>
+            <a:ext cx="9782224" cy="1015663"/>
           </a:xfrm>
           <a:prstGeom prst="rect">
             <a:avLst/>
@@ -5259,1563 +5598,12 @@
           </a:bodyPr>
           <a:lstStyle/>
           <a:p>
-            <a:r>
-              <a:rPr lang="es-ES" dirty="0" smtClean="0"/>
-              <a:t>Modo manual.</a:t>
-            </a:r>
-            <a:endParaRPr lang="es-ES" dirty="0"/>
-          </a:p>
-        </p:txBody>
-      </p:sp>
-      <p:sp>
-        <p:nvSpPr>
-          <p:cNvPr id="103" name="CuadroTexto 102"/>
-          <p:cNvSpPr txBox="1"/>
-          <p:nvPr/>
-        </p:nvSpPr>
-        <p:spPr>
-          <a:xfrm>
-            <a:off x="7805967" y="28734908"/>
-            <a:ext cx="8980448" cy="1154932"/>
-          </a:xfrm>
-          <a:prstGeom prst="rect">
-            <a:avLst/>
-          </a:prstGeom>
-          <a:noFill/>
-        </p:spPr>
-        <p:txBody>
-          <a:bodyPr wrap="square" rtlCol="0">
-            <a:spAutoFit/>
-          </a:bodyPr>
-          <a:lstStyle/>
-          <a:p>
-            <a:r>
-              <a:rPr lang="es-ES" dirty="0" smtClean="0"/>
-              <a:t>Modo automático.</a:t>
-            </a:r>
-            <a:endParaRPr lang="es-ES" dirty="0"/>
-          </a:p>
-        </p:txBody>
-      </p:sp>
-      <p:sp>
-        <p:nvSpPr>
-          <p:cNvPr id="104" name="CuadroTexto 103"/>
-          <p:cNvSpPr txBox="1"/>
-          <p:nvPr/>
-        </p:nvSpPr>
-        <p:spPr>
-          <a:xfrm>
-            <a:off x="6593237" y="20505690"/>
-            <a:ext cx="4246377" cy="954107"/>
-          </a:xfrm>
-          <a:prstGeom prst="rect">
-            <a:avLst/>
-          </a:prstGeom>
-          <a:noFill/>
-        </p:spPr>
-        <p:txBody>
-          <a:bodyPr wrap="square" rtlCol="0">
-            <a:spAutoFit/>
-          </a:bodyPr>
-          <a:lstStyle/>
-          <a:p>
-            <a:r>
-              <a:rPr lang="es-ES" sz="2800" dirty="0" smtClean="0"/>
-              <a:t>Funcionamiento</a:t>
-            </a:r>
-          </a:p>
-          <a:p>
-            <a:r>
-              <a:rPr lang="es-ES" sz="2800" dirty="0"/>
-              <a:t> </a:t>
-            </a:r>
-            <a:r>
-              <a:rPr lang="es-ES" sz="2800" dirty="0" smtClean="0"/>
-              <a:t>       interno.</a:t>
-            </a:r>
-            <a:endParaRPr lang="es-ES" sz="2800" dirty="0"/>
-          </a:p>
-        </p:txBody>
-      </p:sp>
-      <p:sp>
-        <p:nvSpPr>
-          <p:cNvPr id="105" name="CuadroTexto 104"/>
-          <p:cNvSpPr txBox="1"/>
-          <p:nvPr/>
-        </p:nvSpPr>
-        <p:spPr>
-          <a:xfrm>
-            <a:off x="3547682" y="27067887"/>
-            <a:ext cx="3287418" cy="523220"/>
-          </a:xfrm>
-          <a:prstGeom prst="rect">
-            <a:avLst/>
-          </a:prstGeom>
-          <a:noFill/>
-        </p:spPr>
-        <p:txBody>
-          <a:bodyPr wrap="square" rtlCol="0">
-            <a:spAutoFit/>
-          </a:bodyPr>
-          <a:lstStyle/>
-          <a:p>
-            <a:r>
-              <a:rPr lang="es-ES" sz="2800" dirty="0" smtClean="0"/>
-              <a:t>Reducción de grosor</a:t>
-            </a:r>
-            <a:endParaRPr lang="es-ES" sz="2800" dirty="0"/>
-          </a:p>
-        </p:txBody>
-      </p:sp>
-      <p:sp>
-        <p:nvSpPr>
-          <p:cNvPr id="106" name="CuadroTexto 105"/>
-          <p:cNvSpPr txBox="1"/>
-          <p:nvPr/>
-        </p:nvSpPr>
-        <p:spPr>
-          <a:xfrm>
-            <a:off x="17915191" y="28835320"/>
-            <a:ext cx="7987111" cy="954107"/>
-          </a:xfrm>
-          <a:prstGeom prst="rect">
-            <a:avLst/>
-          </a:prstGeom>
-          <a:noFill/>
-        </p:spPr>
-        <p:txBody>
-          <a:bodyPr wrap="square" rtlCol="0">
-            <a:spAutoFit/>
-          </a:bodyPr>
-          <a:lstStyle/>
-          <a:p>
-            <a:r>
-              <a:rPr lang="es-ES" sz="2800" dirty="0" smtClean="0"/>
-              <a:t>La única diferencia internamente es que no calcula la distancia al color sino, utiliza la detección de bordes</a:t>
-            </a:r>
-            <a:endParaRPr lang="es-ES" sz="2800" dirty="0"/>
-          </a:p>
-        </p:txBody>
-      </p:sp>
-      <p:sp>
-        <p:nvSpPr>
-          <p:cNvPr id="98" name="CuadroTexto 97"/>
-          <p:cNvSpPr txBox="1"/>
-          <p:nvPr/>
-        </p:nvSpPr>
-        <p:spPr>
-          <a:xfrm>
-            <a:off x="8460068" y="24907938"/>
-            <a:ext cx="2447684" cy="1154932"/>
-          </a:xfrm>
-          <a:prstGeom prst="rect">
-            <a:avLst/>
-          </a:prstGeom>
-          <a:noFill/>
-        </p:spPr>
-        <p:txBody>
-          <a:bodyPr wrap="square" rtlCol="0">
-            <a:spAutoFit/>
-          </a:bodyPr>
-          <a:lstStyle/>
-          <a:p>
-            <a:endParaRPr lang="es-ES" dirty="0"/>
-          </a:p>
-        </p:txBody>
-      </p:sp>
-      <p:sp>
-        <p:nvSpPr>
-          <p:cNvPr id="108" name="CuadroTexto 107"/>
-          <p:cNvSpPr txBox="1"/>
-          <p:nvPr/>
-        </p:nvSpPr>
-        <p:spPr>
-          <a:xfrm>
-            <a:off x="8491872" y="24819831"/>
-            <a:ext cx="3273057" cy="523220"/>
-          </a:xfrm>
-          <a:prstGeom prst="rect">
-            <a:avLst/>
-          </a:prstGeom>
-          <a:noFill/>
-        </p:spPr>
-        <p:txBody>
-          <a:bodyPr wrap="square" rtlCol="0">
-            <a:spAutoFit/>
-          </a:bodyPr>
-          <a:lstStyle/>
-          <a:p>
-            <a:r>
-              <a:rPr lang="es-ES" sz="2800" dirty="0" smtClean="0"/>
-              <a:t>Unión de segmentos</a:t>
-            </a:r>
-            <a:endParaRPr lang="es-ES" sz="2800" dirty="0"/>
-          </a:p>
-        </p:txBody>
-      </p:sp>
-      <p:sp>
-        <p:nvSpPr>
-          <p:cNvPr id="109" name="CuadroTexto 108"/>
-          <p:cNvSpPr txBox="1"/>
-          <p:nvPr/>
-        </p:nvSpPr>
-        <p:spPr>
-          <a:xfrm>
-            <a:off x="10407583" y="22267261"/>
-            <a:ext cx="1792472" cy="523220"/>
-          </a:xfrm>
-          <a:prstGeom prst="rect">
-            <a:avLst/>
-          </a:prstGeom>
-          <a:noFill/>
-        </p:spPr>
-        <p:txBody>
-          <a:bodyPr wrap="square" rtlCol="0">
-            <a:spAutoFit/>
-          </a:bodyPr>
-          <a:lstStyle/>
-          <a:p>
-            <a:r>
-              <a:rPr lang="es-ES" sz="2800" dirty="0" smtClean="0"/>
-              <a:t>Fin</a:t>
-            </a:r>
-            <a:endParaRPr lang="es-ES" sz="2800" dirty="0"/>
-          </a:p>
-        </p:txBody>
-      </p:sp>
-      <p:sp>
-        <p:nvSpPr>
-          <p:cNvPr id="110" name="CuadroTexto 109"/>
-          <p:cNvSpPr txBox="1"/>
-          <p:nvPr/>
-        </p:nvSpPr>
-        <p:spPr>
-          <a:xfrm>
-            <a:off x="9168463" y="25352491"/>
-            <a:ext cx="2135356" cy="954107"/>
-          </a:xfrm>
-          <a:prstGeom prst="rect">
-            <a:avLst/>
-          </a:prstGeom>
-          <a:noFill/>
-        </p:spPr>
-        <p:txBody>
-          <a:bodyPr wrap="square" rtlCol="0">
-            <a:spAutoFit/>
-          </a:bodyPr>
-          <a:lstStyle/>
-          <a:p>
-            <a:r>
-              <a:rPr lang="es-ES" sz="2800" dirty="0" smtClean="0"/>
-              <a:t>Segmentos</a:t>
-            </a:r>
-          </a:p>
-          <a:p>
-            <a:r>
-              <a:rPr lang="es-ES" sz="2800" dirty="0" smtClean="0"/>
-              <a:t>en las estrías</a:t>
-            </a:r>
-            <a:endParaRPr lang="es-ES" sz="2800" dirty="0"/>
-          </a:p>
-        </p:txBody>
-      </p:sp>
-      <p:sp>
-        <p:nvSpPr>
-          <p:cNvPr id="112" name="CuadroTexto 111"/>
-          <p:cNvSpPr txBox="1"/>
-          <p:nvPr/>
-        </p:nvSpPr>
-        <p:spPr>
-          <a:xfrm>
-            <a:off x="6997330" y="26633001"/>
-            <a:ext cx="2135356" cy="954107"/>
-          </a:xfrm>
-          <a:prstGeom prst="rect">
-            <a:avLst/>
-          </a:prstGeom>
-          <a:noFill/>
-        </p:spPr>
-        <p:txBody>
-          <a:bodyPr wrap="square" rtlCol="0">
-            <a:spAutoFit/>
-          </a:bodyPr>
-          <a:lstStyle/>
-          <a:p>
-            <a:r>
-              <a:rPr lang="es-ES" sz="2800" dirty="0" smtClean="0"/>
-              <a:t>Grafo con los</a:t>
-            </a:r>
-          </a:p>
-          <a:p>
-            <a:r>
-              <a:rPr lang="es-ES" sz="2800" dirty="0"/>
-              <a:t>n</a:t>
-            </a:r>
-            <a:r>
-              <a:rPr lang="es-ES" sz="2800" dirty="0" smtClean="0"/>
-              <a:t>odos.</a:t>
-            </a:r>
-          </a:p>
-        </p:txBody>
-      </p:sp>
-      <p:pic>
-        <p:nvPicPr>
-          <p:cNvPr id="107" name="Imagen 106"/>
-          <p:cNvPicPr>
-            <a:picLocks noChangeAspect="1"/>
-          </p:cNvPicPr>
-          <p:nvPr/>
-        </p:nvPicPr>
-        <p:blipFill>
-          <a:blip r:embed="rId27"/>
-          <a:stretch>
-            <a:fillRect/>
-          </a:stretch>
-        </p:blipFill>
-        <p:spPr>
-          <a:xfrm>
-            <a:off x="15325289" y="25027605"/>
-            <a:ext cx="4269284" cy="3464652"/>
-          </a:xfrm>
-          <a:prstGeom prst="rect">
-            <a:avLst/>
-          </a:prstGeom>
-        </p:spPr>
-      </p:pic>
-      <p:pic>
-        <p:nvPicPr>
-          <p:cNvPr id="113" name="Imagen 112"/>
-          <p:cNvPicPr>
-            <a:picLocks noChangeAspect="1"/>
-          </p:cNvPicPr>
-          <p:nvPr/>
-        </p:nvPicPr>
-        <p:blipFill>
-          <a:blip r:embed="rId28"/>
-          <a:stretch>
-            <a:fillRect/>
-          </a:stretch>
-        </p:blipFill>
-        <p:spPr>
-          <a:xfrm>
-            <a:off x="25536388" y="25008555"/>
-            <a:ext cx="4355631" cy="3464652"/>
-          </a:xfrm>
-          <a:prstGeom prst="rect">
-            <a:avLst/>
-          </a:prstGeom>
-        </p:spPr>
-      </p:pic>
-      <p:sp>
-        <p:nvSpPr>
-          <p:cNvPr id="116" name="CuadroTexto 115"/>
-          <p:cNvSpPr txBox="1"/>
-          <p:nvPr/>
-        </p:nvSpPr>
-        <p:spPr>
-          <a:xfrm>
-            <a:off x="15285198" y="24498156"/>
-            <a:ext cx="4196090" cy="523220"/>
-          </a:xfrm>
-          <a:prstGeom prst="rect">
-            <a:avLst/>
-          </a:prstGeom>
-          <a:noFill/>
-        </p:spPr>
-        <p:txBody>
-          <a:bodyPr wrap="square" rtlCol="0">
-            <a:spAutoFit/>
-          </a:bodyPr>
-          <a:lstStyle/>
-          <a:p>
-            <a:r>
-              <a:rPr lang="es-ES" sz="2800" dirty="0" smtClean="0"/>
-              <a:t>Añadir una estría. </a:t>
-            </a:r>
-            <a:endParaRPr lang="es-ES" sz="2800" dirty="0"/>
-          </a:p>
-        </p:txBody>
-      </p:sp>
-      <p:sp>
-        <p:nvSpPr>
-          <p:cNvPr id="117" name="CuadroTexto 116"/>
-          <p:cNvSpPr txBox="1"/>
-          <p:nvPr/>
-        </p:nvSpPr>
-        <p:spPr>
-          <a:xfrm>
-            <a:off x="25466876" y="24464748"/>
-            <a:ext cx="4196090" cy="523220"/>
-          </a:xfrm>
-          <a:prstGeom prst="rect">
-            <a:avLst/>
-          </a:prstGeom>
-          <a:noFill/>
-        </p:spPr>
-        <p:txBody>
-          <a:bodyPr wrap="square" rtlCol="0">
-            <a:spAutoFit/>
-          </a:bodyPr>
-          <a:lstStyle/>
-          <a:p>
-            <a:r>
-              <a:rPr lang="es-ES" sz="2800" dirty="0" smtClean="0"/>
-              <a:t>Borrar una estría.</a:t>
-            </a:r>
-            <a:endParaRPr lang="es-ES" sz="2800" dirty="0"/>
-          </a:p>
-        </p:txBody>
-      </p:sp>
-      <p:sp>
-        <p:nvSpPr>
-          <p:cNvPr id="118" name="CuadroTexto 117"/>
-          <p:cNvSpPr txBox="1"/>
-          <p:nvPr/>
-        </p:nvSpPr>
-        <p:spPr>
-          <a:xfrm>
-            <a:off x="15361886" y="23012820"/>
-            <a:ext cx="14530133" cy="1384995"/>
-          </a:xfrm>
-          <a:prstGeom prst="rect">
-            <a:avLst/>
-          </a:prstGeom>
-          <a:noFill/>
-        </p:spPr>
-        <p:txBody>
-          <a:bodyPr wrap="square" rtlCol="0">
-            <a:spAutoFit/>
-          </a:bodyPr>
-          <a:lstStyle/>
-          <a:p>
-            <a:r>
-              <a:rPr lang="es-ES" sz="2800" dirty="0" smtClean="0"/>
-              <a:t>Este modo va a consistir en permitir usar la aplicación para medir las estrías como tradicionalmente se han hecho pero acortando el trabajo antiguo ya que con solo pintar ya tendremos las longitudes y medidas al guardar el proyecto.</a:t>
-            </a:r>
-            <a:endParaRPr lang="es-ES" sz="2800" dirty="0"/>
-          </a:p>
-        </p:txBody>
-      </p:sp>
-      <p:sp>
-        <p:nvSpPr>
-          <p:cNvPr id="119" name="CuadroTexto 118"/>
-          <p:cNvSpPr txBox="1"/>
-          <p:nvPr/>
-        </p:nvSpPr>
-        <p:spPr>
-          <a:xfrm>
-            <a:off x="20442262" y="26296763"/>
-            <a:ext cx="4196090" cy="1384995"/>
-          </a:xfrm>
-          <a:prstGeom prst="rect">
-            <a:avLst/>
-          </a:prstGeom>
-          <a:noFill/>
-        </p:spPr>
-        <p:txBody>
-          <a:bodyPr wrap="square" rtlCol="0">
-            <a:spAutoFit/>
-          </a:bodyPr>
-          <a:lstStyle/>
-          <a:p>
-            <a:r>
-              <a:rPr lang="es-ES" sz="2800" dirty="0" smtClean="0"/>
-              <a:t>Como podemos observar borrar y añadir las estrías es un método muy simple.</a:t>
-            </a:r>
-            <a:endParaRPr lang="es-ES" sz="2800" dirty="0"/>
-          </a:p>
-        </p:txBody>
-      </p:sp>
-      <p:sp>
-        <p:nvSpPr>
-          <p:cNvPr id="121" name="Rectángulo 120"/>
-          <p:cNvSpPr/>
-          <p:nvPr/>
-        </p:nvSpPr>
-        <p:spPr>
-          <a:xfrm>
-            <a:off x="5446587" y="30144526"/>
-            <a:ext cx="5352845" cy="4832092"/>
-          </a:xfrm>
-          <a:prstGeom prst="rect">
-            <a:avLst/>
-          </a:prstGeom>
-        </p:spPr>
-        <p:txBody>
-          <a:bodyPr wrap="square">
-            <a:spAutoFit/>
-          </a:bodyPr>
-          <a:lstStyle/>
-          <a:p>
-            <a:r>
-              <a:rPr lang="es-ES" sz="2800" dirty="0" smtClean="0"/>
-              <a:t>Para calculas las estrías en el modo automático no vamos a tener que hacer más que ajustar los parámetros y clicar en calcular.</a:t>
-            </a:r>
-          </a:p>
-          <a:p>
-            <a:endParaRPr lang="es-ES" sz="2800" dirty="0"/>
-          </a:p>
-          <a:p>
-            <a:r>
-              <a:rPr lang="es-ES" sz="2800" dirty="0" smtClean="0"/>
-              <a:t>Este proceso nos llevara unos segundos. </a:t>
-            </a:r>
-          </a:p>
-          <a:p>
-            <a:endParaRPr lang="es-ES" sz="2800" dirty="0" smtClean="0"/>
-          </a:p>
-          <a:p>
-            <a:r>
-              <a:rPr lang="es-ES" sz="2800" dirty="0" smtClean="0"/>
-              <a:t>Después de fijar el cuadrado obtenemos los segmentos que contiene únicamente.</a:t>
-            </a:r>
-            <a:endParaRPr lang="es-ES" sz="2800" dirty="0"/>
-          </a:p>
-        </p:txBody>
-      </p:sp>
-      <p:pic>
-        <p:nvPicPr>
-          <p:cNvPr id="115" name="Imagen 114"/>
-          <p:cNvPicPr>
-            <a:picLocks noChangeAspect="1"/>
-          </p:cNvPicPr>
-          <p:nvPr/>
-        </p:nvPicPr>
-        <p:blipFill>
-          <a:blip r:embed="rId29"/>
-          <a:stretch>
-            <a:fillRect/>
-          </a:stretch>
-        </p:blipFill>
-        <p:spPr>
-          <a:xfrm>
-            <a:off x="623377" y="29008070"/>
-            <a:ext cx="4543696" cy="3687345"/>
-          </a:xfrm>
-          <a:prstGeom prst="rect">
-            <a:avLst/>
-          </a:prstGeom>
-        </p:spPr>
-      </p:pic>
-      <p:pic>
-        <p:nvPicPr>
-          <p:cNvPr id="122" name="Imagen 121"/>
-          <p:cNvPicPr>
-            <a:picLocks noChangeAspect="1"/>
-          </p:cNvPicPr>
-          <p:nvPr/>
-        </p:nvPicPr>
-        <p:blipFill>
-          <a:blip r:embed="rId30"/>
-          <a:stretch>
-            <a:fillRect/>
-          </a:stretch>
-        </p:blipFill>
-        <p:spPr>
-          <a:xfrm>
-            <a:off x="1339638" y="32940961"/>
-            <a:ext cx="3225224" cy="2418918"/>
-          </a:xfrm>
-          <a:prstGeom prst="rect">
-            <a:avLst/>
-          </a:prstGeom>
-        </p:spPr>
-      </p:pic>
-      <p:sp>
-        <p:nvSpPr>
-          <p:cNvPr id="127" name="Llamada rectangular redondeada 126"/>
-          <p:cNvSpPr/>
-          <p:nvPr/>
-        </p:nvSpPr>
-        <p:spPr>
-          <a:xfrm>
-            <a:off x="502398" y="32759579"/>
-            <a:ext cx="4309603" cy="2637739"/>
-          </a:xfrm>
-          <a:prstGeom prst="wedgeRoundRectCallout">
-            <a:avLst>
-              <a:gd name="adj1" fmla="val 4689"/>
-              <a:gd name="adj2" fmla="val -90144"/>
-              <a:gd name="adj3" fmla="val 16667"/>
-            </a:avLst>
-          </a:prstGeom>
-          <a:noFill/>
-          <a:ln w="25400">
-            <a:solidFill>
-              <a:schemeClr val="tx1"/>
-            </a:solidFill>
-          </a:ln>
-        </p:spPr>
-        <p:style>
-          <a:lnRef idx="2">
-            <a:schemeClr val="accent1">
-              <a:shade val="50000"/>
-            </a:schemeClr>
-          </a:lnRef>
-          <a:fillRef idx="1">
-            <a:schemeClr val="accent1"/>
-          </a:fillRef>
-          <a:effectRef idx="0">
-            <a:schemeClr val="accent1"/>
-          </a:effectRef>
-          <a:fontRef idx="minor">
-            <a:schemeClr val="lt1"/>
-          </a:fontRef>
-        </p:style>
-        <p:txBody>
-          <a:bodyPr rtlCol="0" anchor="ctr"/>
-          <a:lstStyle/>
-          <a:p>
             <a:pPr algn="ctr"/>
-            <a:endParaRPr lang="es-ES"/>
-          </a:p>
-        </p:txBody>
-      </p:sp>
-      <p:sp>
-        <p:nvSpPr>
-          <p:cNvPr id="128" name="Elipse 127"/>
-          <p:cNvSpPr/>
-          <p:nvPr/>
-        </p:nvSpPr>
-        <p:spPr>
-          <a:xfrm>
-            <a:off x="11303818" y="29780004"/>
-            <a:ext cx="18359147" cy="5521293"/>
-          </a:xfrm>
-          <a:prstGeom prst="ellipse">
-            <a:avLst/>
-          </a:prstGeom>
-          <a:noFill/>
-          <a:ln w="34925">
-            <a:solidFill>
-              <a:schemeClr val="tx1"/>
-            </a:solidFill>
-          </a:ln>
-        </p:spPr>
-        <p:style>
-          <a:lnRef idx="2">
-            <a:schemeClr val="accent1">
-              <a:shade val="50000"/>
-            </a:schemeClr>
-          </a:lnRef>
-          <a:fillRef idx="1">
-            <a:schemeClr val="accent1"/>
-          </a:fillRef>
-          <a:effectRef idx="0">
-            <a:schemeClr val="accent1"/>
-          </a:effectRef>
-          <a:fontRef idx="minor">
-            <a:schemeClr val="lt1"/>
-          </a:fontRef>
-        </p:style>
-        <p:txBody>
-          <a:bodyPr rtlCol="0" anchor="ctr"/>
-          <a:lstStyle/>
-          <a:p>
-            <a:pPr algn="ctr"/>
-            <a:endParaRPr lang="es-ES"/>
-          </a:p>
-        </p:txBody>
-      </p:sp>
-      <p:sp>
-        <p:nvSpPr>
-          <p:cNvPr id="129" name="Flecha derecha 128"/>
-          <p:cNvSpPr/>
-          <p:nvPr/>
-        </p:nvSpPr>
-        <p:spPr>
-          <a:xfrm rot="21243019">
-            <a:off x="9921615" y="32090609"/>
-            <a:ext cx="1156802" cy="717971"/>
-          </a:xfrm>
-          <a:prstGeom prst="rightArrow">
-            <a:avLst/>
-          </a:prstGeom>
-          <a:solidFill>
-            <a:schemeClr val="bg1">
-              <a:lumMod val="75000"/>
-            </a:schemeClr>
-          </a:solidFill>
-          <a:ln>
-            <a:noFill/>
-          </a:ln>
-        </p:spPr>
-        <p:style>
-          <a:lnRef idx="2">
-            <a:schemeClr val="accent1">
-              <a:shade val="50000"/>
-            </a:schemeClr>
-          </a:lnRef>
-          <a:fillRef idx="1">
-            <a:schemeClr val="accent1"/>
-          </a:fillRef>
-          <a:effectRef idx="0">
-            <a:schemeClr val="accent1"/>
-          </a:effectRef>
-          <a:fontRef idx="minor">
-            <a:schemeClr val="lt1"/>
-          </a:fontRef>
-        </p:style>
-        <p:txBody>
-          <a:bodyPr rtlCol="0" anchor="ctr"/>
-          <a:lstStyle/>
-          <a:p>
-            <a:pPr algn="ctr"/>
-            <a:endParaRPr lang="es-ES"/>
-          </a:p>
-        </p:txBody>
-      </p:sp>
-      <p:pic>
-        <p:nvPicPr>
-          <p:cNvPr id="125" name="Imagen 124"/>
-          <p:cNvPicPr>
-            <a:picLocks noChangeAspect="1"/>
-          </p:cNvPicPr>
-          <p:nvPr/>
-        </p:nvPicPr>
-        <p:blipFill>
-          <a:blip r:embed="rId31"/>
-          <a:stretch>
-            <a:fillRect/>
-          </a:stretch>
-        </p:blipFill>
-        <p:spPr>
-          <a:xfrm>
-            <a:off x="11783121" y="32069308"/>
-            <a:ext cx="1323279" cy="1332043"/>
-          </a:xfrm>
-          <a:prstGeom prst="rect">
-            <a:avLst/>
-          </a:prstGeom>
-        </p:spPr>
-      </p:pic>
-      <p:sp>
-        <p:nvSpPr>
-          <p:cNvPr id="131" name="Flecha derecha 130"/>
-          <p:cNvSpPr/>
-          <p:nvPr/>
-        </p:nvSpPr>
-        <p:spPr>
-          <a:xfrm rot="3062868">
-            <a:off x="13081004" y="33420485"/>
-            <a:ext cx="410577" cy="438107"/>
-          </a:xfrm>
-          <a:prstGeom prst="rightArrow">
-            <a:avLst/>
-          </a:prstGeom>
-          <a:solidFill>
-            <a:schemeClr val="bg1">
-              <a:lumMod val="75000"/>
-            </a:schemeClr>
-          </a:solidFill>
-          <a:ln>
-            <a:noFill/>
-          </a:ln>
-        </p:spPr>
-        <p:style>
-          <a:lnRef idx="2">
-            <a:schemeClr val="accent1">
-              <a:shade val="50000"/>
-            </a:schemeClr>
-          </a:lnRef>
-          <a:fillRef idx="1">
-            <a:schemeClr val="accent1"/>
-          </a:fillRef>
-          <a:effectRef idx="0">
-            <a:schemeClr val="accent1"/>
-          </a:effectRef>
-          <a:fontRef idx="minor">
-            <a:schemeClr val="lt1"/>
-          </a:fontRef>
-        </p:style>
-        <p:txBody>
-          <a:bodyPr rtlCol="0" anchor="ctr"/>
-          <a:lstStyle/>
-          <a:p>
-            <a:pPr algn="ctr"/>
-            <a:endParaRPr lang="es-ES"/>
-          </a:p>
-        </p:txBody>
-      </p:sp>
-      <p:pic>
-        <p:nvPicPr>
-          <p:cNvPr id="126" name="Imagen 125"/>
-          <p:cNvPicPr>
-            <a:picLocks noChangeAspect="1"/>
-          </p:cNvPicPr>
-          <p:nvPr/>
-        </p:nvPicPr>
-        <p:blipFill>
-          <a:blip r:embed="rId32"/>
-          <a:stretch>
-            <a:fillRect/>
-          </a:stretch>
-        </p:blipFill>
-        <p:spPr>
-          <a:xfrm>
-            <a:off x="13699708" y="33076425"/>
-            <a:ext cx="1319101" cy="1314733"/>
-          </a:xfrm>
-          <a:prstGeom prst="rect">
-            <a:avLst/>
-          </a:prstGeom>
-        </p:spPr>
-      </p:pic>
-      <p:pic>
-        <p:nvPicPr>
-          <p:cNvPr id="1024" name="Imagen 1023"/>
-          <p:cNvPicPr>
-            <a:picLocks noChangeAspect="1"/>
-          </p:cNvPicPr>
-          <p:nvPr/>
-        </p:nvPicPr>
-        <p:blipFill>
-          <a:blip r:embed="rId33"/>
-          <a:stretch>
-            <a:fillRect/>
-          </a:stretch>
-        </p:blipFill>
-        <p:spPr>
-          <a:xfrm>
-            <a:off x="14766394" y="30763769"/>
-            <a:ext cx="2167249" cy="1627451"/>
-          </a:xfrm>
-          <a:prstGeom prst="rect">
-            <a:avLst/>
-          </a:prstGeom>
-        </p:spPr>
-      </p:pic>
-      <p:sp>
-        <p:nvSpPr>
-          <p:cNvPr id="134" name="Flecha derecha 133"/>
-          <p:cNvSpPr/>
-          <p:nvPr/>
-        </p:nvSpPr>
-        <p:spPr>
-          <a:xfrm rot="18964807">
-            <a:off x="14646756" y="32489605"/>
-            <a:ext cx="426672" cy="501875"/>
-          </a:xfrm>
-          <a:prstGeom prst="rightArrow">
-            <a:avLst/>
-          </a:prstGeom>
-          <a:solidFill>
-            <a:schemeClr val="bg1">
-              <a:lumMod val="75000"/>
-            </a:schemeClr>
-          </a:solidFill>
-          <a:ln>
-            <a:noFill/>
-          </a:ln>
-        </p:spPr>
-        <p:style>
-          <a:lnRef idx="2">
-            <a:schemeClr val="accent1">
-              <a:shade val="50000"/>
-            </a:schemeClr>
-          </a:lnRef>
-          <a:fillRef idx="1">
-            <a:schemeClr val="accent1"/>
-          </a:fillRef>
-          <a:effectRef idx="0">
-            <a:schemeClr val="accent1"/>
-          </a:effectRef>
-          <a:fontRef idx="minor">
-            <a:schemeClr val="lt1"/>
-          </a:fontRef>
-        </p:style>
-        <p:txBody>
-          <a:bodyPr rtlCol="0" anchor="ctr"/>
-          <a:lstStyle/>
-          <a:p>
-            <a:pPr algn="ctr"/>
-            <a:endParaRPr lang="es-ES"/>
-          </a:p>
-        </p:txBody>
-      </p:sp>
-      <p:sp>
-        <p:nvSpPr>
-          <p:cNvPr id="135" name="Flecha derecha 134"/>
-          <p:cNvSpPr/>
-          <p:nvPr/>
-        </p:nvSpPr>
-        <p:spPr>
-          <a:xfrm rot="3062868">
-            <a:off x="16698373" y="32546575"/>
-            <a:ext cx="410577" cy="438107"/>
-          </a:xfrm>
-          <a:prstGeom prst="rightArrow">
-            <a:avLst/>
-          </a:prstGeom>
-          <a:solidFill>
-            <a:schemeClr val="bg1">
-              <a:lumMod val="75000"/>
-            </a:schemeClr>
-          </a:solidFill>
-          <a:ln>
-            <a:noFill/>
-          </a:ln>
-        </p:spPr>
-        <p:style>
-          <a:lnRef idx="2">
-            <a:schemeClr val="accent1">
-              <a:shade val="50000"/>
-            </a:schemeClr>
-          </a:lnRef>
-          <a:fillRef idx="1">
-            <a:schemeClr val="accent1"/>
-          </a:fillRef>
-          <a:effectRef idx="0">
-            <a:schemeClr val="accent1"/>
-          </a:effectRef>
-          <a:fontRef idx="minor">
-            <a:schemeClr val="lt1"/>
-          </a:fontRef>
-        </p:style>
-        <p:txBody>
-          <a:bodyPr rtlCol="0" anchor="ctr"/>
-          <a:lstStyle/>
-          <a:p>
-            <a:pPr algn="ctr"/>
-            <a:endParaRPr lang="es-ES"/>
-          </a:p>
-        </p:txBody>
-      </p:sp>
-      <p:pic>
-        <p:nvPicPr>
-          <p:cNvPr id="1025" name="Imagen 1024"/>
-          <p:cNvPicPr>
-            <a:picLocks noChangeAspect="1"/>
-          </p:cNvPicPr>
-          <p:nvPr/>
-        </p:nvPicPr>
-        <p:blipFill>
-          <a:blip r:embed="rId34"/>
-          <a:stretch>
-            <a:fillRect/>
-          </a:stretch>
-        </p:blipFill>
-        <p:spPr>
-          <a:xfrm>
-            <a:off x="17066336" y="33056898"/>
-            <a:ext cx="2147132" cy="1646135"/>
-          </a:xfrm>
-          <a:prstGeom prst="rect">
-            <a:avLst/>
-          </a:prstGeom>
-        </p:spPr>
-      </p:pic>
-      <p:sp>
-        <p:nvSpPr>
-          <p:cNvPr id="137" name="Flecha derecha 136"/>
-          <p:cNvSpPr/>
-          <p:nvPr/>
-        </p:nvSpPr>
-        <p:spPr>
-          <a:xfrm rot="18964807">
-            <a:off x="19130418" y="32477226"/>
-            <a:ext cx="426672" cy="501875"/>
-          </a:xfrm>
-          <a:prstGeom prst="rightArrow">
-            <a:avLst/>
-          </a:prstGeom>
-          <a:solidFill>
-            <a:schemeClr val="bg1">
-              <a:lumMod val="75000"/>
-            </a:schemeClr>
-          </a:solidFill>
-          <a:ln>
-            <a:noFill/>
-          </a:ln>
-        </p:spPr>
-        <p:style>
-          <a:lnRef idx="2">
-            <a:schemeClr val="accent1">
-              <a:shade val="50000"/>
-            </a:schemeClr>
-          </a:lnRef>
-          <a:fillRef idx="1">
-            <a:schemeClr val="accent1"/>
-          </a:fillRef>
-          <a:effectRef idx="0">
-            <a:schemeClr val="accent1"/>
-          </a:effectRef>
-          <a:fontRef idx="minor">
-            <a:schemeClr val="lt1"/>
-          </a:fontRef>
-        </p:style>
-        <p:txBody>
-          <a:bodyPr rtlCol="0" anchor="ctr"/>
-          <a:lstStyle/>
-          <a:p>
-            <a:pPr algn="ctr"/>
-            <a:endParaRPr lang="es-ES"/>
-          </a:p>
-        </p:txBody>
-      </p:sp>
-      <p:pic>
-        <p:nvPicPr>
-          <p:cNvPr id="1026" name="Imagen 1025"/>
-          <p:cNvPicPr>
-            <a:picLocks noChangeAspect="1"/>
-          </p:cNvPicPr>
-          <p:nvPr/>
-        </p:nvPicPr>
-        <p:blipFill>
-          <a:blip r:embed="rId35"/>
-          <a:stretch>
-            <a:fillRect/>
-          </a:stretch>
-        </p:blipFill>
-        <p:spPr>
-          <a:xfrm>
-            <a:off x="19594572" y="30763769"/>
-            <a:ext cx="2223466" cy="1657493"/>
-          </a:xfrm>
-          <a:prstGeom prst="rect">
-            <a:avLst/>
-          </a:prstGeom>
-        </p:spPr>
-      </p:pic>
-      <p:sp>
-        <p:nvSpPr>
-          <p:cNvPr id="139" name="Flecha derecha 138"/>
-          <p:cNvSpPr/>
-          <p:nvPr/>
-        </p:nvSpPr>
-        <p:spPr>
-          <a:xfrm rot="3062868">
-            <a:off x="21923122" y="32552863"/>
-            <a:ext cx="410577" cy="438107"/>
-          </a:xfrm>
-          <a:prstGeom prst="rightArrow">
-            <a:avLst/>
-          </a:prstGeom>
-          <a:solidFill>
-            <a:schemeClr val="bg1">
-              <a:lumMod val="75000"/>
-            </a:schemeClr>
-          </a:solidFill>
-          <a:ln>
-            <a:noFill/>
-          </a:ln>
-        </p:spPr>
-        <p:style>
-          <a:lnRef idx="2">
-            <a:schemeClr val="accent1">
-              <a:shade val="50000"/>
-            </a:schemeClr>
-          </a:lnRef>
-          <a:fillRef idx="1">
-            <a:schemeClr val="accent1"/>
-          </a:fillRef>
-          <a:effectRef idx="0">
-            <a:schemeClr val="accent1"/>
-          </a:effectRef>
-          <a:fontRef idx="minor">
-            <a:schemeClr val="lt1"/>
-          </a:fontRef>
-        </p:style>
-        <p:txBody>
-          <a:bodyPr rtlCol="0" anchor="ctr"/>
-          <a:lstStyle/>
-          <a:p>
-            <a:pPr algn="ctr"/>
-            <a:endParaRPr lang="es-ES"/>
-          </a:p>
-        </p:txBody>
-      </p:sp>
-      <p:pic>
-        <p:nvPicPr>
-          <p:cNvPr id="1027" name="Imagen 1026"/>
-          <p:cNvPicPr>
-            <a:picLocks noChangeAspect="1"/>
-          </p:cNvPicPr>
-          <p:nvPr/>
-        </p:nvPicPr>
-        <p:blipFill>
-          <a:blip r:embed="rId36"/>
-          <a:stretch>
-            <a:fillRect/>
-          </a:stretch>
-        </p:blipFill>
-        <p:spPr>
-          <a:xfrm>
-            <a:off x="22198422" y="33075781"/>
-            <a:ext cx="2147132" cy="1608368"/>
-          </a:xfrm>
-          <a:prstGeom prst="rect">
-            <a:avLst/>
-          </a:prstGeom>
-        </p:spPr>
-      </p:pic>
-      <p:pic>
-        <p:nvPicPr>
-          <p:cNvPr id="1029" name="Imagen 1028"/>
-          <p:cNvPicPr>
-            <a:picLocks noChangeAspect="1"/>
-          </p:cNvPicPr>
-          <p:nvPr/>
-        </p:nvPicPr>
-        <p:blipFill>
-          <a:blip r:embed="rId37"/>
-          <a:stretch>
-            <a:fillRect/>
-          </a:stretch>
-        </p:blipFill>
-        <p:spPr>
-          <a:xfrm>
-            <a:off x="23192829" y="30768278"/>
-            <a:ext cx="2194476" cy="1635735"/>
-          </a:xfrm>
-          <a:prstGeom prst="rect">
-            <a:avLst/>
-          </a:prstGeom>
-        </p:spPr>
-      </p:pic>
-      <p:sp>
-        <p:nvSpPr>
-          <p:cNvPr id="142" name="Flecha derecha 141"/>
-          <p:cNvSpPr/>
-          <p:nvPr/>
-        </p:nvSpPr>
-        <p:spPr>
-          <a:xfrm rot="18964807">
-            <a:off x="23181061" y="32511267"/>
-            <a:ext cx="426672" cy="501875"/>
-          </a:xfrm>
-          <a:prstGeom prst="rightArrow">
-            <a:avLst/>
-          </a:prstGeom>
-          <a:solidFill>
-            <a:schemeClr val="bg1">
-              <a:lumMod val="75000"/>
-            </a:schemeClr>
-          </a:solidFill>
-          <a:ln>
-            <a:noFill/>
-          </a:ln>
-        </p:spPr>
-        <p:style>
-          <a:lnRef idx="2">
-            <a:schemeClr val="accent1">
-              <a:shade val="50000"/>
-            </a:schemeClr>
-          </a:lnRef>
-          <a:fillRef idx="1">
-            <a:schemeClr val="accent1"/>
-          </a:fillRef>
-          <a:effectRef idx="0">
-            <a:schemeClr val="accent1"/>
-          </a:effectRef>
-          <a:fontRef idx="minor">
-            <a:schemeClr val="lt1"/>
-          </a:fontRef>
-        </p:style>
-        <p:txBody>
-          <a:bodyPr rtlCol="0" anchor="ctr"/>
-          <a:lstStyle/>
-          <a:p>
-            <a:pPr algn="ctr"/>
-            <a:endParaRPr lang="es-ES"/>
-          </a:p>
-        </p:txBody>
-      </p:sp>
-      <p:sp>
-        <p:nvSpPr>
-          <p:cNvPr id="143" name="Flecha derecha 142"/>
-          <p:cNvSpPr/>
-          <p:nvPr/>
-        </p:nvSpPr>
-        <p:spPr>
-          <a:xfrm rot="1195672">
-            <a:off x="26671129" y="32454503"/>
-            <a:ext cx="410577" cy="438107"/>
-          </a:xfrm>
-          <a:prstGeom prst="rightArrow">
-            <a:avLst/>
-          </a:prstGeom>
-          <a:solidFill>
-            <a:schemeClr val="bg1">
-              <a:lumMod val="75000"/>
-            </a:schemeClr>
-          </a:solidFill>
-          <a:ln>
-            <a:noFill/>
-          </a:ln>
-        </p:spPr>
-        <p:style>
-          <a:lnRef idx="2">
-            <a:schemeClr val="accent1">
-              <a:shade val="50000"/>
-            </a:schemeClr>
-          </a:lnRef>
-          <a:fillRef idx="1">
-            <a:schemeClr val="accent1"/>
-          </a:fillRef>
-          <a:effectRef idx="0">
-            <a:schemeClr val="accent1"/>
-          </a:effectRef>
-          <a:fontRef idx="minor">
-            <a:schemeClr val="lt1"/>
-          </a:fontRef>
-        </p:style>
-        <p:txBody>
-          <a:bodyPr rtlCol="0" anchor="ctr"/>
-          <a:lstStyle/>
-          <a:p>
-            <a:pPr algn="ctr"/>
-            <a:endParaRPr lang="es-ES"/>
-          </a:p>
-        </p:txBody>
-      </p:sp>
-      <p:pic>
-        <p:nvPicPr>
-          <p:cNvPr id="1030" name="Imagen 1029"/>
-          <p:cNvPicPr>
-            <a:picLocks noChangeAspect="1"/>
-          </p:cNvPicPr>
-          <p:nvPr/>
-        </p:nvPicPr>
-        <p:blipFill>
-          <a:blip r:embed="rId38"/>
-          <a:stretch>
-            <a:fillRect/>
-          </a:stretch>
-        </p:blipFill>
-        <p:spPr>
-          <a:xfrm>
-            <a:off x="26187336" y="31505720"/>
-            <a:ext cx="2792406" cy="2109704"/>
-          </a:xfrm>
-          <a:prstGeom prst="rect">
-            <a:avLst/>
-          </a:prstGeom>
-        </p:spPr>
-      </p:pic>
-      <p:sp>
-        <p:nvSpPr>
-          <p:cNvPr id="145" name="Flecha derecha 144"/>
-          <p:cNvSpPr/>
-          <p:nvPr/>
-        </p:nvSpPr>
-        <p:spPr>
-          <a:xfrm>
-            <a:off x="25578227" y="31942102"/>
-            <a:ext cx="410577" cy="438107"/>
-          </a:xfrm>
-          <a:prstGeom prst="rightArrow">
-            <a:avLst/>
-          </a:prstGeom>
-          <a:solidFill>
-            <a:schemeClr val="bg1">
-              <a:lumMod val="75000"/>
-            </a:schemeClr>
-          </a:solidFill>
-          <a:ln>
-            <a:noFill/>
-          </a:ln>
-        </p:spPr>
-        <p:style>
-          <a:lnRef idx="2">
-            <a:schemeClr val="accent1">
-              <a:shade val="50000"/>
-            </a:schemeClr>
-          </a:lnRef>
-          <a:fillRef idx="1">
-            <a:schemeClr val="accent1"/>
-          </a:fillRef>
-          <a:effectRef idx="0">
-            <a:schemeClr val="accent1"/>
-          </a:effectRef>
-          <a:fontRef idx="minor">
-            <a:schemeClr val="lt1"/>
-          </a:fontRef>
-        </p:style>
-        <p:txBody>
-          <a:bodyPr rtlCol="0" anchor="ctr"/>
-          <a:lstStyle/>
-          <a:p>
-            <a:pPr algn="ctr"/>
-            <a:endParaRPr lang="es-ES"/>
-          </a:p>
-        </p:txBody>
-      </p:sp>
-      <p:sp>
-        <p:nvSpPr>
-          <p:cNvPr id="146" name="CuadroTexto 145"/>
-          <p:cNvSpPr txBox="1"/>
-          <p:nvPr/>
-        </p:nvSpPr>
-        <p:spPr>
-          <a:xfrm>
-            <a:off x="11543268" y="31699077"/>
-            <a:ext cx="2989092" cy="400110"/>
-          </a:xfrm>
-          <a:prstGeom prst="rect">
-            <a:avLst/>
-          </a:prstGeom>
-          <a:noFill/>
-        </p:spPr>
-        <p:txBody>
-          <a:bodyPr wrap="square" rtlCol="0">
-            <a:spAutoFit/>
-          </a:bodyPr>
-          <a:lstStyle/>
-          <a:p>
-            <a:r>
-              <a:rPr lang="es-ES" sz="2000" dirty="0" smtClean="0"/>
-              <a:t>Histograma original</a:t>
-            </a:r>
-            <a:endParaRPr lang="es-ES" sz="2000" dirty="0"/>
-          </a:p>
-        </p:txBody>
-      </p:sp>
-      <p:sp>
-        <p:nvSpPr>
-          <p:cNvPr id="147" name="CuadroTexto 146"/>
-          <p:cNvSpPr txBox="1"/>
-          <p:nvPr/>
-        </p:nvSpPr>
-        <p:spPr>
-          <a:xfrm>
-            <a:off x="13257114" y="32866601"/>
-            <a:ext cx="3351204" cy="400110"/>
-          </a:xfrm>
-          <a:prstGeom prst="rect">
-            <a:avLst/>
-          </a:prstGeom>
-          <a:noFill/>
-        </p:spPr>
-        <p:txBody>
-          <a:bodyPr wrap="square" rtlCol="0">
-            <a:spAutoFit/>
-          </a:bodyPr>
-          <a:lstStyle/>
-          <a:p>
-            <a:r>
-              <a:rPr lang="es-ES" sz="2000" dirty="0" smtClean="0"/>
-              <a:t>Histograma ecualizado</a:t>
-            </a:r>
-            <a:endParaRPr lang="es-ES" sz="2000" dirty="0"/>
-          </a:p>
-        </p:txBody>
-      </p:sp>
-      <p:sp>
-        <p:nvSpPr>
-          <p:cNvPr id="148" name="CuadroTexto 147"/>
-          <p:cNvSpPr txBox="1"/>
-          <p:nvPr/>
-        </p:nvSpPr>
-        <p:spPr>
-          <a:xfrm>
-            <a:off x="14418733" y="30401462"/>
-            <a:ext cx="3351204" cy="400110"/>
-          </a:xfrm>
-          <a:prstGeom prst="rect">
-            <a:avLst/>
-          </a:prstGeom>
-          <a:noFill/>
-        </p:spPr>
-        <p:txBody>
-          <a:bodyPr wrap="square" rtlCol="0">
-            <a:spAutoFit/>
-          </a:bodyPr>
-          <a:lstStyle/>
-          <a:p>
-            <a:r>
-              <a:rPr lang="es-ES" sz="2000" dirty="0" smtClean="0"/>
-              <a:t>Autovectores</a:t>
-            </a:r>
-            <a:r>
-              <a:rPr lang="es-ES" sz="2000" dirty="0"/>
-              <a:t> </a:t>
-            </a:r>
-            <a:r>
-              <a:rPr lang="es-ES" sz="2000" dirty="0" smtClean="0"/>
-              <a:t>matriz Hessiana</a:t>
-            </a:r>
-            <a:endParaRPr lang="es-ES" sz="2000" dirty="0"/>
-          </a:p>
-        </p:txBody>
-      </p:sp>
-      <p:sp>
-        <p:nvSpPr>
-          <p:cNvPr id="149" name="CuadroTexto 148"/>
-          <p:cNvSpPr txBox="1"/>
-          <p:nvPr/>
-        </p:nvSpPr>
-        <p:spPr>
-          <a:xfrm>
-            <a:off x="16994477" y="34744208"/>
-            <a:ext cx="3351204" cy="400110"/>
-          </a:xfrm>
-          <a:prstGeom prst="rect">
-            <a:avLst/>
-          </a:prstGeom>
-          <a:noFill/>
-        </p:spPr>
-        <p:txBody>
-          <a:bodyPr wrap="square" rtlCol="0">
-            <a:spAutoFit/>
-          </a:bodyPr>
-          <a:lstStyle/>
-          <a:p>
-            <a:r>
-              <a:rPr lang="es-ES" sz="2000" dirty="0" smtClean="0"/>
-              <a:t>Imagen binarizada</a:t>
-            </a:r>
-            <a:endParaRPr lang="es-ES" sz="2000" dirty="0"/>
-          </a:p>
-        </p:txBody>
-      </p:sp>
-      <p:sp>
-        <p:nvSpPr>
-          <p:cNvPr id="150" name="CuadroTexto 149"/>
-          <p:cNvSpPr txBox="1"/>
-          <p:nvPr/>
-        </p:nvSpPr>
-        <p:spPr>
-          <a:xfrm>
-            <a:off x="19317027" y="30375553"/>
-            <a:ext cx="3351204" cy="400110"/>
-          </a:xfrm>
-          <a:prstGeom prst="rect">
-            <a:avLst/>
-          </a:prstGeom>
-          <a:noFill/>
-        </p:spPr>
-        <p:txBody>
-          <a:bodyPr wrap="square" rtlCol="0">
-            <a:spAutoFit/>
-          </a:bodyPr>
-          <a:lstStyle/>
-          <a:p>
-            <a:r>
-              <a:rPr lang="es-ES" sz="2000" dirty="0" smtClean="0"/>
-              <a:t>Eliminación de ruido 1</a:t>
-            </a:r>
-            <a:endParaRPr lang="es-ES" sz="2000" dirty="0"/>
-          </a:p>
-        </p:txBody>
-      </p:sp>
-      <p:sp>
-        <p:nvSpPr>
-          <p:cNvPr id="151" name="CuadroTexto 150"/>
-          <p:cNvSpPr txBox="1"/>
-          <p:nvPr/>
-        </p:nvSpPr>
-        <p:spPr>
-          <a:xfrm>
-            <a:off x="21785390" y="34731709"/>
-            <a:ext cx="3351204" cy="400110"/>
-          </a:xfrm>
-          <a:prstGeom prst="rect">
-            <a:avLst/>
-          </a:prstGeom>
-          <a:noFill/>
-        </p:spPr>
-        <p:txBody>
-          <a:bodyPr wrap="square" rtlCol="0">
-            <a:spAutoFit/>
-          </a:bodyPr>
-          <a:lstStyle/>
-          <a:p>
-            <a:r>
-              <a:rPr lang="es-ES" sz="2000" dirty="0" smtClean="0"/>
-              <a:t>Eliminación de ruido 2</a:t>
-            </a:r>
-            <a:endParaRPr lang="es-ES" sz="2000" dirty="0"/>
-          </a:p>
-        </p:txBody>
-      </p:sp>
-      <p:sp>
-        <p:nvSpPr>
-          <p:cNvPr id="152" name="CuadroTexto 151"/>
-          <p:cNvSpPr txBox="1"/>
-          <p:nvPr/>
-        </p:nvSpPr>
-        <p:spPr>
-          <a:xfrm>
-            <a:off x="23066665" y="30350707"/>
-            <a:ext cx="2306986" cy="400110"/>
-          </a:xfrm>
-          <a:prstGeom prst="rect">
-            <a:avLst/>
-          </a:prstGeom>
-          <a:noFill/>
-        </p:spPr>
-        <p:txBody>
-          <a:bodyPr wrap="square" rtlCol="0">
-            <a:spAutoFit/>
-          </a:bodyPr>
-          <a:lstStyle/>
-          <a:p>
-            <a:r>
-              <a:rPr lang="es-ES" sz="2000" dirty="0" smtClean="0"/>
-              <a:t>Reducción de grosor</a:t>
-            </a:r>
-            <a:endParaRPr lang="es-ES" sz="2000" dirty="0"/>
-          </a:p>
-        </p:txBody>
-      </p:sp>
-      <p:sp>
-        <p:nvSpPr>
-          <p:cNvPr id="153" name="CuadroTexto 152"/>
-          <p:cNvSpPr txBox="1"/>
-          <p:nvPr/>
-        </p:nvSpPr>
-        <p:spPr>
-          <a:xfrm>
-            <a:off x="26668685" y="30994479"/>
-            <a:ext cx="1792472" cy="523220"/>
-          </a:xfrm>
-          <a:prstGeom prst="rect">
-            <a:avLst/>
-          </a:prstGeom>
-          <a:noFill/>
-        </p:spPr>
-        <p:txBody>
-          <a:bodyPr wrap="square" rtlCol="0">
-            <a:spAutoFit/>
-          </a:bodyPr>
-          <a:lstStyle/>
-          <a:p>
-            <a:r>
-              <a:rPr lang="es-ES" sz="2800" dirty="0" smtClean="0"/>
-              <a:t>Fin</a:t>
-            </a:r>
-            <a:endParaRPr lang="es-ES" sz="2800" dirty="0"/>
-          </a:p>
-        </p:txBody>
-      </p:sp>
-      <p:sp>
-        <p:nvSpPr>
-          <p:cNvPr id="154" name="CuadroTexto 153"/>
-          <p:cNvSpPr txBox="1"/>
-          <p:nvPr/>
-        </p:nvSpPr>
-        <p:spPr>
-          <a:xfrm>
-            <a:off x="6678195" y="22525956"/>
-            <a:ext cx="1792472" cy="523220"/>
-          </a:xfrm>
-          <a:prstGeom prst="rect">
-            <a:avLst/>
-          </a:prstGeom>
-          <a:noFill/>
-        </p:spPr>
-        <p:txBody>
-          <a:bodyPr wrap="square" rtlCol="0">
-            <a:spAutoFit/>
-          </a:bodyPr>
-          <a:lstStyle/>
-          <a:p>
-            <a:r>
-              <a:rPr lang="es-ES" sz="2800" dirty="0" smtClean="0"/>
-              <a:t>Hough</a:t>
-            </a:r>
-            <a:endParaRPr lang="es-ES" sz="2800" dirty="0"/>
+            <a:r>
+              <a:rPr lang="es-ES" sz="6000" dirty="0" smtClean="0"/>
+              <a:t>Ejecución del algoritmo</a:t>
+            </a:r>
+            <a:endParaRPr lang="es-ES" sz="6000" dirty="0"/>
           </a:p>
         </p:txBody>
       </p:sp>

</xml_diff>